<commit_message>
Deployed 83a33e7 with MkDocs version: 1.0.4
</commit_message>
<xml_diff>
--- a/presentacion/Herramientas-y-javascript.pptx
+++ b/presentacion/Herramientas-y-javascript.pptx
@@ -9,9 +9,11 @@
     <p:sldId id="265" r:id="rId3"/>
     <p:sldId id="266" r:id="rId4"/>
     <p:sldId id="268" r:id="rId5"/>
-    <p:sldId id="269" r:id="rId6"/>
-    <p:sldId id="267" r:id="rId7"/>
-    <p:sldId id="270" r:id="rId8"/>
+    <p:sldId id="271" r:id="rId6"/>
+    <p:sldId id="272" r:id="rId7"/>
+    <p:sldId id="269" r:id="rId8"/>
+    <p:sldId id="267" r:id="rId9"/>
+    <p:sldId id="270" r:id="rId10"/>
   </p:sldIdLst>
   <p:sldSz cx="9144000" cy="6858000" type="screen4x3"/>
   <p:notesSz cx="6858000" cy="9144000"/>
@@ -466,7 +468,7 @@
               <a:pPr>
                 <a:defRPr/>
               </a:pPr>
-              <a:t>‹Nº›</a:t>
+              <a:t>‹#›</a:t>
             </a:fld>
             <a:endParaRPr lang="fr-FR" altLang="es-ES"/>
           </a:p>
@@ -797,7 +799,7 @@
               <a:pPr>
                 <a:defRPr/>
               </a:pPr>
-              <a:t>‹Nº›</a:t>
+              <a:t>‹#›</a:t>
             </a:fld>
             <a:endParaRPr lang="fr-FR" altLang="es-ES"/>
           </a:p>
@@ -1293,7 +1295,7 @@
               <a:pPr>
                 <a:defRPr/>
               </a:pPr>
-              <a:t>‹Nº›</a:t>
+              <a:t>‹#›</a:t>
             </a:fld>
             <a:endParaRPr lang="fr-FR" altLang="es-ES"/>
           </a:p>
@@ -1670,7 +1672,7 @@
               <a:pPr>
                 <a:defRPr/>
               </a:pPr>
-              <a:t>‹Nº›</a:t>
+              <a:t>‹#›</a:t>
             </a:fld>
             <a:endParaRPr lang="fr-FR" altLang="es-ES"/>
           </a:p>
@@ -1951,7 +1953,7 @@
               <a:pPr>
                 <a:defRPr/>
               </a:pPr>
-              <a:t>‹Nº›</a:t>
+              <a:t>‹#›</a:t>
             </a:fld>
             <a:endParaRPr lang="fr-FR" altLang="es-ES"/>
           </a:p>
@@ -2285,7 +2287,7 @@
               <a:pPr>
                 <a:defRPr/>
               </a:pPr>
-              <a:t>‹Nº›</a:t>
+              <a:t>‹#›</a:t>
             </a:fld>
             <a:endParaRPr lang="fr-FR" altLang="es-ES"/>
           </a:p>
@@ -2576,7 +2578,7 @@
               <a:pPr>
                 <a:defRPr/>
               </a:pPr>
-              <a:t>‹Nº›</a:t>
+              <a:t>‹#›</a:t>
             </a:fld>
             <a:endParaRPr lang="fr-FR" altLang="es-ES"/>
           </a:p>
@@ -2927,7 +2929,7 @@
               <a:pPr>
                 <a:defRPr/>
               </a:pPr>
-              <a:t>‹Nº›</a:t>
+              <a:t>‹#›</a:t>
             </a:fld>
             <a:endParaRPr lang="fr-FR" altLang="es-ES"/>
           </a:p>
@@ -3279,7 +3281,7 @@
               <a:pPr>
                 <a:defRPr/>
               </a:pPr>
-              <a:t>‹Nº›</a:t>
+              <a:t>‹#›</a:t>
             </a:fld>
             <a:endParaRPr lang="fr-FR" altLang="es-ES"/>
           </a:p>
@@ -3764,7 +3766,7 @@
               <a:pPr>
                 <a:defRPr/>
               </a:pPr>
-              <a:t>‹Nº›</a:t>
+              <a:t>‹#›</a:t>
             </a:fld>
             <a:endParaRPr lang="fr-FR" altLang="es-ES"/>
           </a:p>
@@ -3993,7 +3995,7 @@
               <a:pPr>
                 <a:defRPr/>
               </a:pPr>
-              <a:t>‹Nº›</a:t>
+              <a:t>‹#›</a:t>
             </a:fld>
             <a:endParaRPr lang="fr-FR" altLang="es-ES"/>
           </a:p>
@@ -4096,7 +4098,7 @@
               <a:pPr>
                 <a:defRPr/>
               </a:pPr>
-              <a:t>‹Nº›</a:t>
+              <a:t>‹#›</a:t>
             </a:fld>
             <a:endParaRPr lang="fr-FR" altLang="es-ES"/>
           </a:p>
@@ -4571,7 +4573,7 @@
               <a:pPr>
                 <a:defRPr/>
               </a:pPr>
-              <a:t>‹Nº›</a:t>
+              <a:t>‹#›</a:t>
             </a:fld>
             <a:endParaRPr lang="fr-FR" altLang="es-ES"/>
           </a:p>
@@ -4902,7 +4904,7 @@
               <a:pPr>
                 <a:defRPr/>
               </a:pPr>
-              <a:t>‹Nº›</a:t>
+              <a:t>‹#›</a:t>
             </a:fld>
             <a:endParaRPr lang="fr-FR" altLang="es-ES"/>
           </a:p>
@@ -5167,7 +5169,7 @@
               <a:pPr>
                 <a:defRPr/>
               </a:pPr>
-              <a:t>‹Nº›</a:t>
+              <a:t>‹#›</a:t>
             </a:fld>
             <a:endParaRPr lang="fr-FR" altLang="es-ES"/>
           </a:p>
@@ -7541,6 +7543,663 @@
         </p:nvSpPr>
         <p:spPr bwMode="auto">
           <a:xfrm>
+            <a:off x="827584" y="404664"/>
+            <a:ext cx="6310313" cy="396875"/>
+          </a:xfrm>
+          <a:prstGeom prst="rect">
+            <a:avLst/>
+          </a:prstGeom>
+          <a:noFill/>
+          <a:ln>
+            <a:noFill/>
+          </a:ln>
+          <a:extLst>
+            <a:ext uri="{909E8E84-426E-40DD-AFC4-6F175D3DCCD1}">
+              <a14:hiddenFill xmlns:a14="http://schemas.microsoft.com/office/drawing/2010/main">
+                <a:solidFill>
+                  <a:srgbClr val="FFFFFF"/>
+                </a:solidFill>
+              </a14:hiddenFill>
+            </a:ext>
+            <a:ext uri="{91240B29-F687-4F45-9708-019B960494DF}">
+              <a14:hiddenLine xmlns:a14="http://schemas.microsoft.com/office/drawing/2010/main" w="9525">
+                <a:solidFill>
+                  <a:srgbClr val="000000"/>
+                </a:solidFill>
+                <a:miter lim="800000"/>
+                <a:headEnd/>
+                <a:tailEnd/>
+              </a14:hiddenLine>
+            </a:ext>
+          </a:extLst>
+        </p:spPr>
+        <p:txBody>
+          <a:bodyPr>
+            <a:spAutoFit/>
+          </a:bodyPr>
+          <a:lstStyle>
+            <a:lvl1pPr>
+              <a:spcBef>
+                <a:spcPct val="20000"/>
+              </a:spcBef>
+              <a:buChar char="•"/>
+              <a:defRPr sz="3200">
+                <a:solidFill>
+                  <a:schemeClr val="tx1"/>
+                </a:solidFill>
+                <a:latin typeface="Times New Roman" panose="02020603050405020304" pitchFamily="18" charset="0"/>
+              </a:defRPr>
+            </a:lvl1pPr>
+            <a:lvl2pPr marL="742950" indent="-285750">
+              <a:spcBef>
+                <a:spcPct val="20000"/>
+              </a:spcBef>
+              <a:buChar char="–"/>
+              <a:defRPr sz="2800">
+                <a:solidFill>
+                  <a:schemeClr val="tx1"/>
+                </a:solidFill>
+                <a:latin typeface="Times New Roman" panose="02020603050405020304" pitchFamily="18" charset="0"/>
+              </a:defRPr>
+            </a:lvl2pPr>
+            <a:lvl3pPr marL="1143000" indent="-228600">
+              <a:spcBef>
+                <a:spcPct val="20000"/>
+              </a:spcBef>
+              <a:buChar char="•"/>
+              <a:defRPr sz="2400">
+                <a:solidFill>
+                  <a:schemeClr val="tx1"/>
+                </a:solidFill>
+                <a:latin typeface="Times New Roman" panose="02020603050405020304" pitchFamily="18" charset="0"/>
+              </a:defRPr>
+            </a:lvl3pPr>
+            <a:lvl4pPr marL="1600200" indent="-228600">
+              <a:spcBef>
+                <a:spcPct val="20000"/>
+              </a:spcBef>
+              <a:buChar char="–"/>
+              <a:defRPr sz="2000">
+                <a:solidFill>
+                  <a:schemeClr val="tx1"/>
+                </a:solidFill>
+                <a:latin typeface="Times New Roman" panose="02020603050405020304" pitchFamily="18" charset="0"/>
+              </a:defRPr>
+            </a:lvl4pPr>
+            <a:lvl5pPr marL="2057400" indent="-228600">
+              <a:spcBef>
+                <a:spcPct val="20000"/>
+              </a:spcBef>
+              <a:buChar char="»"/>
+              <a:defRPr sz="2000">
+                <a:solidFill>
+                  <a:schemeClr val="tx1"/>
+                </a:solidFill>
+                <a:latin typeface="Times New Roman" panose="02020603050405020304" pitchFamily="18" charset="0"/>
+              </a:defRPr>
+            </a:lvl5pPr>
+            <a:lvl6pPr marL="2514600" indent="-228600" eaLnBrk="0" fontAlgn="base" hangingPunct="0">
+              <a:spcBef>
+                <a:spcPct val="20000"/>
+              </a:spcBef>
+              <a:spcAft>
+                <a:spcPct val="0"/>
+              </a:spcAft>
+              <a:buChar char="»"/>
+              <a:defRPr sz="2000">
+                <a:solidFill>
+                  <a:schemeClr val="tx1"/>
+                </a:solidFill>
+                <a:latin typeface="Times New Roman" panose="02020603050405020304" pitchFamily="18" charset="0"/>
+              </a:defRPr>
+            </a:lvl6pPr>
+            <a:lvl7pPr marL="2971800" indent="-228600" eaLnBrk="0" fontAlgn="base" hangingPunct="0">
+              <a:spcBef>
+                <a:spcPct val="20000"/>
+              </a:spcBef>
+              <a:spcAft>
+                <a:spcPct val="0"/>
+              </a:spcAft>
+              <a:buChar char="»"/>
+              <a:defRPr sz="2000">
+                <a:solidFill>
+                  <a:schemeClr val="tx1"/>
+                </a:solidFill>
+                <a:latin typeface="Times New Roman" panose="02020603050405020304" pitchFamily="18" charset="0"/>
+              </a:defRPr>
+            </a:lvl7pPr>
+            <a:lvl8pPr marL="3429000" indent="-228600" eaLnBrk="0" fontAlgn="base" hangingPunct="0">
+              <a:spcBef>
+                <a:spcPct val="20000"/>
+              </a:spcBef>
+              <a:spcAft>
+                <a:spcPct val="0"/>
+              </a:spcAft>
+              <a:buChar char="»"/>
+              <a:defRPr sz="2000">
+                <a:solidFill>
+                  <a:schemeClr val="tx1"/>
+                </a:solidFill>
+                <a:latin typeface="Times New Roman" panose="02020603050405020304" pitchFamily="18" charset="0"/>
+              </a:defRPr>
+            </a:lvl8pPr>
+            <a:lvl9pPr marL="3886200" indent="-228600" eaLnBrk="0" fontAlgn="base" hangingPunct="0">
+              <a:spcBef>
+                <a:spcPct val="20000"/>
+              </a:spcBef>
+              <a:spcAft>
+                <a:spcPct val="0"/>
+              </a:spcAft>
+              <a:buChar char="»"/>
+              <a:defRPr sz="2000">
+                <a:solidFill>
+                  <a:schemeClr val="tx1"/>
+                </a:solidFill>
+                <a:latin typeface="Times New Roman" panose="02020603050405020304" pitchFamily="18" charset="0"/>
+              </a:defRPr>
+            </a:lvl9pPr>
+          </a:lstStyle>
+          <a:p>
+            <a:pPr eaLnBrk="1" hangingPunct="1">
+              <a:spcBef>
+                <a:spcPct val="50000"/>
+              </a:spcBef>
+              <a:buFontTx/>
+              <a:buNone/>
+            </a:pPr>
+            <a:r>
+              <a:rPr lang="es-ES" altLang="ca-ES" sz="2000" dirty="0">
+                <a:solidFill>
+                  <a:srgbClr val="FFFF99"/>
+                </a:solidFill>
+                <a:latin typeface="Swis721 Ex BT" pitchFamily="34" charset="0"/>
+              </a:rPr>
+              <a:t>Puntos fuertes de </a:t>
+            </a:r>
+            <a:r>
+              <a:rPr lang="es-ES" altLang="ca-ES" sz="2000" dirty="0" err="1">
+                <a:solidFill>
+                  <a:srgbClr val="FFFF99"/>
+                </a:solidFill>
+                <a:latin typeface="Swis721 Ex BT" pitchFamily="34" charset="0"/>
+              </a:rPr>
+              <a:t>Leaflet</a:t>
+            </a:r>
+            <a:endParaRPr lang="es-ES" altLang="ca-ES" sz="2000" dirty="0">
+              <a:solidFill>
+                <a:srgbClr val="FFFF99"/>
+              </a:solidFill>
+              <a:latin typeface="Swis721 Ex BT" pitchFamily="34" charset="0"/>
+            </a:endParaRPr>
+          </a:p>
+        </p:txBody>
+      </p:sp>
+      <p:pic>
+        <p:nvPicPr>
+          <p:cNvPr id="3" name="Imagen 2">
+            <a:extLst>
+              <a:ext uri="{FF2B5EF4-FFF2-40B4-BE49-F238E27FC236}">
+                <a16:creationId xmlns:a16="http://schemas.microsoft.com/office/drawing/2014/main" id="{B50DF2EB-C259-40F7-90E9-36793C82ED59}"/>
+              </a:ext>
+            </a:extLst>
+          </p:cNvPr>
+          <p:cNvPicPr>
+            <a:picLocks noChangeAspect="1"/>
+          </p:cNvPicPr>
+          <p:nvPr/>
+        </p:nvPicPr>
+        <p:blipFill>
+          <a:blip r:embed="rId2"/>
+          <a:stretch>
+            <a:fillRect/>
+          </a:stretch>
+        </p:blipFill>
+        <p:spPr>
+          <a:xfrm>
+            <a:off x="326480" y="1340768"/>
+            <a:ext cx="3176985" cy="842303"/>
+          </a:xfrm>
+          <a:prstGeom prst="rect">
+            <a:avLst/>
+          </a:prstGeom>
+        </p:spPr>
+      </p:pic>
+      <p:sp>
+        <p:nvSpPr>
+          <p:cNvPr id="4" name="CuadroTexto 3">
+            <a:extLst>
+              <a:ext uri="{FF2B5EF4-FFF2-40B4-BE49-F238E27FC236}">
+                <a16:creationId xmlns:a16="http://schemas.microsoft.com/office/drawing/2014/main" id="{8D25D9C8-B08B-4B81-9397-BC59254EB5B4}"/>
+              </a:ext>
+            </a:extLst>
+          </p:cNvPr>
+          <p:cNvSpPr txBox="1"/>
+          <p:nvPr/>
+        </p:nvSpPr>
+        <p:spPr>
+          <a:xfrm>
+            <a:off x="1259632" y="2782669"/>
+            <a:ext cx="6748963" cy="369332"/>
+          </a:xfrm>
+          <a:prstGeom prst="rect">
+            <a:avLst/>
+          </a:prstGeom>
+          <a:noFill/>
+        </p:spPr>
+        <p:txBody>
+          <a:bodyPr wrap="none" rtlCol="0">
+            <a:spAutoFit/>
+          </a:bodyPr>
+          <a:lstStyle/>
+          <a:p>
+            <a:r>
+              <a:rPr lang="es-ES" dirty="0"/>
+              <a:t>La programación es bastante parecida a </a:t>
+            </a:r>
+            <a:r>
+              <a:rPr lang="es-ES" dirty="0" err="1"/>
+              <a:t>GoogleMaps</a:t>
+            </a:r>
+            <a:r>
+              <a:rPr lang="es-ES" dirty="0"/>
+              <a:t> API</a:t>
+            </a:r>
+          </a:p>
+        </p:txBody>
+      </p:sp>
+      <p:sp>
+        <p:nvSpPr>
+          <p:cNvPr id="9" name="CuadroTexto 3">
+            <a:extLst>
+              <a:ext uri="{FF2B5EF4-FFF2-40B4-BE49-F238E27FC236}">
+                <a16:creationId xmlns:a16="http://schemas.microsoft.com/office/drawing/2014/main" id="{789C3AC6-6692-44AC-913B-D7AB0FFF2649}"/>
+              </a:ext>
+            </a:extLst>
+          </p:cNvPr>
+          <p:cNvSpPr txBox="1"/>
+          <p:nvPr/>
+        </p:nvSpPr>
+        <p:spPr>
+          <a:xfrm>
+            <a:off x="1403648" y="3462949"/>
+            <a:ext cx="2414444" cy="369332"/>
+          </a:xfrm>
+          <a:prstGeom prst="rect">
+            <a:avLst/>
+          </a:prstGeom>
+          <a:noFill/>
+        </p:spPr>
+        <p:txBody>
+          <a:bodyPr wrap="none" rtlCol="0">
+            <a:spAutoFit/>
+          </a:bodyPr>
+          <a:lstStyle/>
+          <a:p>
+            <a:r>
+              <a:rPr lang="es-ES" dirty="0"/>
+              <a:t>“Fácil” de aprender</a:t>
+            </a:r>
+          </a:p>
+        </p:txBody>
+      </p:sp>
+      <p:sp>
+        <p:nvSpPr>
+          <p:cNvPr id="10" name="CuadroTexto 3">
+            <a:extLst>
+              <a:ext uri="{FF2B5EF4-FFF2-40B4-BE49-F238E27FC236}">
+                <a16:creationId xmlns:a16="http://schemas.microsoft.com/office/drawing/2014/main" id="{9D31B0D7-60BD-4E03-B445-18EA8BC6D92C}"/>
+              </a:ext>
+            </a:extLst>
+          </p:cNvPr>
+          <p:cNvSpPr txBox="1"/>
+          <p:nvPr/>
+        </p:nvSpPr>
+        <p:spPr>
+          <a:xfrm>
+            <a:off x="1331640" y="4143229"/>
+            <a:ext cx="2828018" cy="369332"/>
+          </a:xfrm>
+          <a:prstGeom prst="rect">
+            <a:avLst/>
+          </a:prstGeom>
+          <a:noFill/>
+        </p:spPr>
+        <p:txBody>
+          <a:bodyPr wrap="none" rtlCol="0">
+            <a:spAutoFit/>
+          </a:bodyPr>
+          <a:lstStyle/>
+          <a:p>
+            <a:r>
+              <a:rPr lang="es-ES" dirty="0"/>
+              <a:t>API bien documentada</a:t>
+            </a:r>
+          </a:p>
+        </p:txBody>
+      </p:sp>
+      <p:sp>
+        <p:nvSpPr>
+          <p:cNvPr id="11" name="CuadroTexto 3">
+            <a:extLst>
+              <a:ext uri="{FF2B5EF4-FFF2-40B4-BE49-F238E27FC236}">
+                <a16:creationId xmlns:a16="http://schemas.microsoft.com/office/drawing/2014/main" id="{7082FBC1-761C-4183-87FE-6D2151B16D91}"/>
+              </a:ext>
+            </a:extLst>
+          </p:cNvPr>
+          <p:cNvSpPr txBox="1"/>
+          <p:nvPr/>
+        </p:nvSpPr>
+        <p:spPr>
+          <a:xfrm>
+            <a:off x="1259632" y="4941168"/>
+            <a:ext cx="6147837" cy="646331"/>
+          </a:xfrm>
+          <a:prstGeom prst="rect">
+            <a:avLst/>
+          </a:prstGeom>
+          <a:noFill/>
+        </p:spPr>
+        <p:txBody>
+          <a:bodyPr wrap="none" rtlCol="0">
+            <a:spAutoFit/>
+          </a:bodyPr>
+          <a:lstStyle/>
+          <a:p>
+            <a:r>
+              <a:rPr lang="es-ES" dirty="0"/>
+              <a:t>Contiene muchos </a:t>
+            </a:r>
+            <a:r>
+              <a:rPr lang="es-ES" dirty="0" err="1"/>
+              <a:t>plugins</a:t>
+            </a:r>
+            <a:r>
+              <a:rPr lang="es-ES" dirty="0"/>
+              <a:t> i podemos realizar muchos </a:t>
+            </a:r>
+          </a:p>
+          <a:p>
+            <a:r>
+              <a:rPr lang="es-ES" dirty="0"/>
+              <a:t>tipos de aplicaciones de forma rápida</a:t>
+            </a:r>
+          </a:p>
+        </p:txBody>
+      </p:sp>
+    </p:spTree>
+    <p:extLst>
+      <p:ext uri="{BB962C8B-B14F-4D97-AF65-F5344CB8AC3E}">
+        <p14:creationId xmlns:p14="http://schemas.microsoft.com/office/powerpoint/2010/main" val="2019881671"/>
+      </p:ext>
+    </p:extLst>
+  </p:cSld>
+  <p:clrMapOvr>
+    <a:masterClrMapping/>
+  </p:clrMapOvr>
+</p:sld>
+</file>
+
+<file path=ppt/slides/slide6.xml><?xml version="1.0" encoding="utf-8"?>
+<p:sld xmlns:a="http://schemas.openxmlformats.org/drawingml/2006/main" xmlns:r="http://schemas.openxmlformats.org/officeDocument/2006/relationships" xmlns:p="http://schemas.openxmlformats.org/presentationml/2006/main">
+  <p:cSld>
+    <p:spTree>
+      <p:nvGrpSpPr>
+        <p:cNvPr id="1" name=""/>
+        <p:cNvGrpSpPr/>
+        <p:nvPr/>
+      </p:nvGrpSpPr>
+      <p:grpSpPr>
+        <a:xfrm>
+          <a:off x="0" y="0"/>
+          <a:ext cx="0" cy="0"/>
+          <a:chOff x="0" y="0"/>
+          <a:chExt cx="0" cy="0"/>
+        </a:xfrm>
+      </p:grpSpPr>
+      <p:sp>
+        <p:nvSpPr>
+          <p:cNvPr id="5" name="Text Box 2">
+            <a:extLst>
+              <a:ext uri="{FF2B5EF4-FFF2-40B4-BE49-F238E27FC236}">
+                <a16:creationId xmlns:a16="http://schemas.microsoft.com/office/drawing/2014/main" id="{9B73A55D-E84C-40D7-AF5F-F27B9EACEC4C}"/>
+              </a:ext>
+            </a:extLst>
+          </p:cNvPr>
+          <p:cNvSpPr txBox="1">
+            <a:spLocks noChangeArrowheads="1"/>
+          </p:cNvSpPr>
+          <p:nvPr/>
+        </p:nvSpPr>
+        <p:spPr bwMode="auto">
+          <a:xfrm>
+            <a:off x="2915816" y="2564904"/>
+            <a:ext cx="4320480" cy="1015663"/>
+          </a:xfrm>
+          <a:prstGeom prst="rect">
+            <a:avLst/>
+          </a:prstGeom>
+          <a:noFill/>
+          <a:ln>
+            <a:noFill/>
+          </a:ln>
+          <a:extLst>
+            <a:ext uri="{909E8E84-426E-40DD-AFC4-6F175D3DCCD1}">
+              <a14:hiddenFill xmlns:a14="http://schemas.microsoft.com/office/drawing/2010/main">
+                <a:solidFill>
+                  <a:srgbClr val="FFFFFF"/>
+                </a:solidFill>
+              </a14:hiddenFill>
+            </a:ext>
+            <a:ext uri="{91240B29-F687-4F45-9708-019B960494DF}">
+              <a14:hiddenLine xmlns:a14="http://schemas.microsoft.com/office/drawing/2010/main" w="9525">
+                <a:solidFill>
+                  <a:srgbClr val="000000"/>
+                </a:solidFill>
+                <a:miter lim="800000"/>
+                <a:headEnd/>
+                <a:tailEnd/>
+              </a14:hiddenLine>
+            </a:ext>
+          </a:extLst>
+        </p:spPr>
+        <p:txBody>
+          <a:bodyPr wrap="square">
+            <a:spAutoFit/>
+          </a:bodyPr>
+          <a:lstStyle>
+            <a:lvl1pPr>
+              <a:spcBef>
+                <a:spcPct val="20000"/>
+              </a:spcBef>
+              <a:buChar char="•"/>
+              <a:defRPr sz="3200">
+                <a:solidFill>
+                  <a:schemeClr val="tx1"/>
+                </a:solidFill>
+                <a:latin typeface="Times New Roman" panose="02020603050405020304" pitchFamily="18" charset="0"/>
+              </a:defRPr>
+            </a:lvl1pPr>
+            <a:lvl2pPr marL="742950" indent="-285750">
+              <a:spcBef>
+                <a:spcPct val="20000"/>
+              </a:spcBef>
+              <a:buChar char="–"/>
+              <a:defRPr sz="2800">
+                <a:solidFill>
+                  <a:schemeClr val="tx1"/>
+                </a:solidFill>
+                <a:latin typeface="Times New Roman" panose="02020603050405020304" pitchFamily="18" charset="0"/>
+              </a:defRPr>
+            </a:lvl2pPr>
+            <a:lvl3pPr marL="1143000" indent="-228600">
+              <a:spcBef>
+                <a:spcPct val="20000"/>
+              </a:spcBef>
+              <a:buChar char="•"/>
+              <a:defRPr sz="2400">
+                <a:solidFill>
+                  <a:schemeClr val="tx1"/>
+                </a:solidFill>
+                <a:latin typeface="Times New Roman" panose="02020603050405020304" pitchFamily="18" charset="0"/>
+              </a:defRPr>
+            </a:lvl3pPr>
+            <a:lvl4pPr marL="1600200" indent="-228600">
+              <a:spcBef>
+                <a:spcPct val="20000"/>
+              </a:spcBef>
+              <a:buChar char="–"/>
+              <a:defRPr sz="2000">
+                <a:solidFill>
+                  <a:schemeClr val="tx1"/>
+                </a:solidFill>
+                <a:latin typeface="Times New Roman" panose="02020603050405020304" pitchFamily="18" charset="0"/>
+              </a:defRPr>
+            </a:lvl4pPr>
+            <a:lvl5pPr marL="2057400" indent="-228600">
+              <a:spcBef>
+                <a:spcPct val="20000"/>
+              </a:spcBef>
+              <a:buChar char="»"/>
+              <a:defRPr sz="2000">
+                <a:solidFill>
+                  <a:schemeClr val="tx1"/>
+                </a:solidFill>
+                <a:latin typeface="Times New Roman" panose="02020603050405020304" pitchFamily="18" charset="0"/>
+              </a:defRPr>
+            </a:lvl5pPr>
+            <a:lvl6pPr marL="2514600" indent="-228600" eaLnBrk="0" fontAlgn="base" hangingPunct="0">
+              <a:spcBef>
+                <a:spcPct val="20000"/>
+              </a:spcBef>
+              <a:spcAft>
+                <a:spcPct val="0"/>
+              </a:spcAft>
+              <a:buChar char="»"/>
+              <a:defRPr sz="2000">
+                <a:solidFill>
+                  <a:schemeClr val="tx1"/>
+                </a:solidFill>
+                <a:latin typeface="Times New Roman" panose="02020603050405020304" pitchFamily="18" charset="0"/>
+              </a:defRPr>
+            </a:lvl6pPr>
+            <a:lvl7pPr marL="2971800" indent="-228600" eaLnBrk="0" fontAlgn="base" hangingPunct="0">
+              <a:spcBef>
+                <a:spcPct val="20000"/>
+              </a:spcBef>
+              <a:spcAft>
+                <a:spcPct val="0"/>
+              </a:spcAft>
+              <a:buChar char="»"/>
+              <a:defRPr sz="2000">
+                <a:solidFill>
+                  <a:schemeClr val="tx1"/>
+                </a:solidFill>
+                <a:latin typeface="Times New Roman" panose="02020603050405020304" pitchFamily="18" charset="0"/>
+              </a:defRPr>
+            </a:lvl7pPr>
+            <a:lvl8pPr marL="3429000" indent="-228600" eaLnBrk="0" fontAlgn="base" hangingPunct="0">
+              <a:spcBef>
+                <a:spcPct val="20000"/>
+              </a:spcBef>
+              <a:spcAft>
+                <a:spcPct val="0"/>
+              </a:spcAft>
+              <a:buChar char="»"/>
+              <a:defRPr sz="2000">
+                <a:solidFill>
+                  <a:schemeClr val="tx1"/>
+                </a:solidFill>
+                <a:latin typeface="Times New Roman" panose="02020603050405020304" pitchFamily="18" charset="0"/>
+              </a:defRPr>
+            </a:lvl8pPr>
+            <a:lvl9pPr marL="3886200" indent="-228600" eaLnBrk="0" fontAlgn="base" hangingPunct="0">
+              <a:spcBef>
+                <a:spcPct val="20000"/>
+              </a:spcBef>
+              <a:spcAft>
+                <a:spcPct val="0"/>
+              </a:spcAft>
+              <a:buChar char="»"/>
+              <a:defRPr sz="2000">
+                <a:solidFill>
+                  <a:schemeClr val="tx1"/>
+                </a:solidFill>
+                <a:latin typeface="Times New Roman" panose="02020603050405020304" pitchFamily="18" charset="0"/>
+              </a:defRPr>
+            </a:lvl9pPr>
+          </a:lstStyle>
+          <a:p>
+            <a:pPr eaLnBrk="1" hangingPunct="1">
+              <a:spcBef>
+                <a:spcPct val="50000"/>
+              </a:spcBef>
+              <a:buFontTx/>
+              <a:buNone/>
+            </a:pPr>
+            <a:r>
+              <a:rPr lang="es-ES" altLang="ca-ES" sz="6000" dirty="0" err="1">
+                <a:solidFill>
+                  <a:srgbClr val="FFFF99"/>
+                </a:solidFill>
+                <a:latin typeface="Swis721 Ex BT" pitchFamily="34" charset="0"/>
+              </a:rPr>
+              <a:t>Javascript</a:t>
+            </a:r>
+            <a:endParaRPr lang="es-ES" altLang="ca-ES" sz="6000" dirty="0">
+              <a:solidFill>
+                <a:srgbClr val="FFFF99"/>
+              </a:solidFill>
+              <a:latin typeface="Swis721 Ex BT" pitchFamily="34" charset="0"/>
+            </a:endParaRPr>
+          </a:p>
+        </p:txBody>
+      </p:sp>
+    </p:spTree>
+    <p:extLst>
+      <p:ext uri="{BB962C8B-B14F-4D97-AF65-F5344CB8AC3E}">
+        <p14:creationId xmlns:p14="http://schemas.microsoft.com/office/powerpoint/2010/main" val="3763532400"/>
+      </p:ext>
+    </p:extLst>
+  </p:cSld>
+  <p:clrMapOvr>
+    <a:masterClrMapping/>
+  </p:clrMapOvr>
+</p:sld>
+</file>
+
+<file path=ppt/slides/slide7.xml><?xml version="1.0" encoding="utf-8"?>
+<p:sld xmlns:a="http://schemas.openxmlformats.org/drawingml/2006/main" xmlns:r="http://schemas.openxmlformats.org/officeDocument/2006/relationships" xmlns:p="http://schemas.openxmlformats.org/presentationml/2006/main">
+  <p:cSld>
+    <p:spTree>
+      <p:nvGrpSpPr>
+        <p:cNvPr id="1" name=""/>
+        <p:cNvGrpSpPr/>
+        <p:nvPr/>
+      </p:nvGrpSpPr>
+      <p:grpSpPr>
+        <a:xfrm>
+          <a:off x="0" y="0"/>
+          <a:ext cx="0" cy="0"/>
+          <a:chOff x="0" y="0"/>
+          <a:chExt cx="0" cy="0"/>
+        </a:xfrm>
+      </p:grpSpPr>
+      <p:sp>
+        <p:nvSpPr>
+          <p:cNvPr id="2" name="Text Box 2">
+            <a:extLst>
+              <a:ext uri="{FF2B5EF4-FFF2-40B4-BE49-F238E27FC236}">
+                <a16:creationId xmlns:a16="http://schemas.microsoft.com/office/drawing/2014/main" id="{6D7650AE-C4F3-47FE-B940-CE2F45073856}"/>
+              </a:ext>
+            </a:extLst>
+          </p:cNvPr>
+          <p:cNvSpPr txBox="1">
+            <a:spLocks noChangeArrowheads="1"/>
+          </p:cNvSpPr>
+          <p:nvPr/>
+        </p:nvSpPr>
+        <p:spPr bwMode="auto">
+          <a:xfrm>
             <a:off x="323528" y="404664"/>
             <a:ext cx="6310313" cy="396875"/>
           </a:xfrm>
@@ -7769,7 +8428,7 @@
 </p:sld>
 </file>
 
-<file path=ppt/slides/slide6.xml><?xml version="1.0" encoding="utf-8"?>
+<file path=ppt/slides/slide8.xml><?xml version="1.0" encoding="utf-8"?>
 <p:sld xmlns:a="http://schemas.openxmlformats.org/drawingml/2006/main" xmlns:r="http://schemas.openxmlformats.org/officeDocument/2006/relationships" xmlns:p="http://schemas.openxmlformats.org/presentationml/2006/main">
   <p:cSld>
     <p:spTree>
@@ -8030,7 +8689,7 @@
 </p:sld>
 </file>
 
-<file path=ppt/slides/slide7.xml><?xml version="1.0" encoding="utf-8"?>
+<file path=ppt/slides/slide9.xml><?xml version="1.0" encoding="utf-8"?>
 <p:sld xmlns:a="http://schemas.openxmlformats.org/drawingml/2006/main" xmlns:r="http://schemas.openxmlformats.org/officeDocument/2006/relationships" xmlns:p="http://schemas.openxmlformats.org/presentationml/2006/main">
   <p:cSld>
     <p:spTree>

</xml_diff>

<commit_message>
Deployed 9e536dd with MkDocs version: 1.0.4
</commit_message>
<xml_diff>
--- a/presentacion/Herramientas-y-javascript.pptx
+++ b/presentacion/Herramientas-y-javascript.pptx
@@ -10,10 +10,12 @@
     <p:sldId id="266" r:id="rId4"/>
     <p:sldId id="268" r:id="rId5"/>
     <p:sldId id="271" r:id="rId6"/>
-    <p:sldId id="272" r:id="rId7"/>
-    <p:sldId id="269" r:id="rId8"/>
-    <p:sldId id="267" r:id="rId9"/>
-    <p:sldId id="270" r:id="rId10"/>
+    <p:sldId id="273" r:id="rId7"/>
+    <p:sldId id="274" r:id="rId8"/>
+    <p:sldId id="272" r:id="rId9"/>
+    <p:sldId id="269" r:id="rId10"/>
+    <p:sldId id="267" r:id="rId11"/>
+    <p:sldId id="270" r:id="rId12"/>
   </p:sldIdLst>
   <p:sldSz cx="9144000" cy="6858000" type="screen4x3"/>
   <p:notesSz cx="6858000" cy="9144000"/>
@@ -6340,6 +6342,679 @@
 </p:sld>
 </file>
 
+<file path=ppt/slides/slide10.xml><?xml version="1.0" encoding="utf-8"?>
+<p:sld xmlns:a="http://schemas.openxmlformats.org/drawingml/2006/main" xmlns:r="http://schemas.openxmlformats.org/officeDocument/2006/relationships" xmlns:p="http://schemas.openxmlformats.org/presentationml/2006/main">
+  <p:cSld>
+    <p:spTree>
+      <p:nvGrpSpPr>
+        <p:cNvPr id="1" name=""/>
+        <p:cNvGrpSpPr/>
+        <p:nvPr/>
+      </p:nvGrpSpPr>
+      <p:grpSpPr>
+        <a:xfrm>
+          <a:off x="0" y="0"/>
+          <a:ext cx="0" cy="0"/>
+          <a:chOff x="0" y="0"/>
+          <a:chExt cx="0" cy="0"/>
+        </a:xfrm>
+      </p:grpSpPr>
+      <p:sp>
+        <p:nvSpPr>
+          <p:cNvPr id="2" name="Text Box 2">
+            <a:extLst>
+              <a:ext uri="{FF2B5EF4-FFF2-40B4-BE49-F238E27FC236}">
+                <a16:creationId xmlns:a16="http://schemas.microsoft.com/office/drawing/2014/main" id="{6D7650AE-C4F3-47FE-B940-CE2F45073856}"/>
+              </a:ext>
+            </a:extLst>
+          </p:cNvPr>
+          <p:cNvSpPr txBox="1">
+            <a:spLocks noChangeArrowheads="1"/>
+          </p:cNvSpPr>
+          <p:nvPr/>
+        </p:nvSpPr>
+        <p:spPr bwMode="auto">
+          <a:xfrm>
+            <a:off x="323528" y="404664"/>
+            <a:ext cx="6310313" cy="396875"/>
+          </a:xfrm>
+          <a:prstGeom prst="rect">
+            <a:avLst/>
+          </a:prstGeom>
+          <a:noFill/>
+          <a:ln>
+            <a:noFill/>
+          </a:ln>
+          <a:extLst>
+            <a:ext uri="{909E8E84-426E-40DD-AFC4-6F175D3DCCD1}">
+              <a14:hiddenFill xmlns:a14="http://schemas.microsoft.com/office/drawing/2010/main">
+                <a:solidFill>
+                  <a:srgbClr val="FFFFFF"/>
+                </a:solidFill>
+              </a14:hiddenFill>
+            </a:ext>
+            <a:ext uri="{91240B29-F687-4F45-9708-019B960494DF}">
+              <a14:hiddenLine xmlns:a14="http://schemas.microsoft.com/office/drawing/2010/main" w="9525">
+                <a:solidFill>
+                  <a:srgbClr val="000000"/>
+                </a:solidFill>
+                <a:miter lim="800000"/>
+                <a:headEnd/>
+                <a:tailEnd/>
+              </a14:hiddenLine>
+            </a:ext>
+          </a:extLst>
+        </p:spPr>
+        <p:txBody>
+          <a:bodyPr>
+            <a:spAutoFit/>
+          </a:bodyPr>
+          <a:lstStyle>
+            <a:lvl1pPr>
+              <a:spcBef>
+                <a:spcPct val="20000"/>
+              </a:spcBef>
+              <a:buChar char="•"/>
+              <a:defRPr sz="3200">
+                <a:solidFill>
+                  <a:schemeClr val="tx1"/>
+                </a:solidFill>
+                <a:latin typeface="Times New Roman" panose="02020603050405020304" pitchFamily="18" charset="0"/>
+              </a:defRPr>
+            </a:lvl1pPr>
+            <a:lvl2pPr marL="742950" indent="-285750">
+              <a:spcBef>
+                <a:spcPct val="20000"/>
+              </a:spcBef>
+              <a:buChar char="–"/>
+              <a:defRPr sz="2800">
+                <a:solidFill>
+                  <a:schemeClr val="tx1"/>
+                </a:solidFill>
+                <a:latin typeface="Times New Roman" panose="02020603050405020304" pitchFamily="18" charset="0"/>
+              </a:defRPr>
+            </a:lvl2pPr>
+            <a:lvl3pPr marL="1143000" indent="-228600">
+              <a:spcBef>
+                <a:spcPct val="20000"/>
+              </a:spcBef>
+              <a:buChar char="•"/>
+              <a:defRPr sz="2400">
+                <a:solidFill>
+                  <a:schemeClr val="tx1"/>
+                </a:solidFill>
+                <a:latin typeface="Times New Roman" panose="02020603050405020304" pitchFamily="18" charset="0"/>
+              </a:defRPr>
+            </a:lvl3pPr>
+            <a:lvl4pPr marL="1600200" indent="-228600">
+              <a:spcBef>
+                <a:spcPct val="20000"/>
+              </a:spcBef>
+              <a:buChar char="–"/>
+              <a:defRPr sz="2000">
+                <a:solidFill>
+                  <a:schemeClr val="tx1"/>
+                </a:solidFill>
+                <a:latin typeface="Times New Roman" panose="02020603050405020304" pitchFamily="18" charset="0"/>
+              </a:defRPr>
+            </a:lvl4pPr>
+            <a:lvl5pPr marL="2057400" indent="-228600">
+              <a:spcBef>
+                <a:spcPct val="20000"/>
+              </a:spcBef>
+              <a:buChar char="»"/>
+              <a:defRPr sz="2000">
+                <a:solidFill>
+                  <a:schemeClr val="tx1"/>
+                </a:solidFill>
+                <a:latin typeface="Times New Roman" panose="02020603050405020304" pitchFamily="18" charset="0"/>
+              </a:defRPr>
+            </a:lvl5pPr>
+            <a:lvl6pPr marL="2514600" indent="-228600" eaLnBrk="0" fontAlgn="base" hangingPunct="0">
+              <a:spcBef>
+                <a:spcPct val="20000"/>
+              </a:spcBef>
+              <a:spcAft>
+                <a:spcPct val="0"/>
+              </a:spcAft>
+              <a:buChar char="»"/>
+              <a:defRPr sz="2000">
+                <a:solidFill>
+                  <a:schemeClr val="tx1"/>
+                </a:solidFill>
+                <a:latin typeface="Times New Roman" panose="02020603050405020304" pitchFamily="18" charset="0"/>
+              </a:defRPr>
+            </a:lvl6pPr>
+            <a:lvl7pPr marL="2971800" indent="-228600" eaLnBrk="0" fontAlgn="base" hangingPunct="0">
+              <a:spcBef>
+                <a:spcPct val="20000"/>
+              </a:spcBef>
+              <a:spcAft>
+                <a:spcPct val="0"/>
+              </a:spcAft>
+              <a:buChar char="»"/>
+              <a:defRPr sz="2000">
+                <a:solidFill>
+                  <a:schemeClr val="tx1"/>
+                </a:solidFill>
+                <a:latin typeface="Times New Roman" panose="02020603050405020304" pitchFamily="18" charset="0"/>
+              </a:defRPr>
+            </a:lvl7pPr>
+            <a:lvl8pPr marL="3429000" indent="-228600" eaLnBrk="0" fontAlgn="base" hangingPunct="0">
+              <a:spcBef>
+                <a:spcPct val="20000"/>
+              </a:spcBef>
+              <a:spcAft>
+                <a:spcPct val="0"/>
+              </a:spcAft>
+              <a:buChar char="»"/>
+              <a:defRPr sz="2000">
+                <a:solidFill>
+                  <a:schemeClr val="tx1"/>
+                </a:solidFill>
+                <a:latin typeface="Times New Roman" panose="02020603050405020304" pitchFamily="18" charset="0"/>
+              </a:defRPr>
+            </a:lvl8pPr>
+            <a:lvl9pPr marL="3886200" indent="-228600" eaLnBrk="0" fontAlgn="base" hangingPunct="0">
+              <a:spcBef>
+                <a:spcPct val="20000"/>
+              </a:spcBef>
+              <a:spcAft>
+                <a:spcPct val="0"/>
+              </a:spcAft>
+              <a:buChar char="»"/>
+              <a:defRPr sz="2000">
+                <a:solidFill>
+                  <a:schemeClr val="tx1"/>
+                </a:solidFill>
+                <a:latin typeface="Times New Roman" panose="02020603050405020304" pitchFamily="18" charset="0"/>
+              </a:defRPr>
+            </a:lvl9pPr>
+          </a:lstStyle>
+          <a:p>
+            <a:pPr eaLnBrk="1" hangingPunct="1">
+              <a:spcBef>
+                <a:spcPct val="50000"/>
+              </a:spcBef>
+              <a:buFontTx/>
+              <a:buNone/>
+            </a:pPr>
+            <a:r>
+              <a:rPr lang="es-ES" altLang="ca-ES" sz="2000" dirty="0" err="1">
+                <a:solidFill>
+                  <a:srgbClr val="FFFF99"/>
+                </a:solidFill>
+                <a:latin typeface="Swis721 Ex BT" pitchFamily="34" charset="0"/>
+              </a:rPr>
+              <a:t>Javascript</a:t>
+            </a:r>
+            <a:r>
+              <a:rPr lang="es-ES" altLang="ca-ES" sz="2000" dirty="0">
+                <a:solidFill>
+                  <a:srgbClr val="FFFF99"/>
+                </a:solidFill>
+                <a:latin typeface="Swis721 Ex BT" pitchFamily="34" charset="0"/>
+              </a:rPr>
+              <a:t>¿?</a:t>
+            </a:r>
+          </a:p>
+        </p:txBody>
+      </p:sp>
+      <p:pic>
+        <p:nvPicPr>
+          <p:cNvPr id="10" name="Imagen 9">
+            <a:extLst>
+              <a:ext uri="{FF2B5EF4-FFF2-40B4-BE49-F238E27FC236}">
+                <a16:creationId xmlns:a16="http://schemas.microsoft.com/office/drawing/2014/main" id="{A6345476-4D35-45F9-AB66-35BB06F8BD06}"/>
+              </a:ext>
+            </a:extLst>
+          </p:cNvPr>
+          <p:cNvPicPr>
+            <a:picLocks noChangeAspect="1"/>
+          </p:cNvPicPr>
+          <p:nvPr/>
+        </p:nvPicPr>
+        <p:blipFill>
+          <a:blip r:embed="rId2"/>
+          <a:stretch>
+            <a:fillRect/>
+          </a:stretch>
+        </p:blipFill>
+        <p:spPr>
+          <a:xfrm>
+            <a:off x="1331640" y="908720"/>
+            <a:ext cx="6806530" cy="5445224"/>
+          </a:xfrm>
+          <a:prstGeom prst="rect">
+            <a:avLst/>
+          </a:prstGeom>
+        </p:spPr>
+      </p:pic>
+    </p:spTree>
+    <p:extLst>
+      <p:ext uri="{BB962C8B-B14F-4D97-AF65-F5344CB8AC3E}">
+        <p14:creationId xmlns:p14="http://schemas.microsoft.com/office/powerpoint/2010/main" val="784667809"/>
+      </p:ext>
+    </p:extLst>
+  </p:cSld>
+  <p:clrMapOvr>
+    <a:masterClrMapping/>
+  </p:clrMapOvr>
+</p:sld>
+</file>
+
+<file path=ppt/slides/slide11.xml><?xml version="1.0" encoding="utf-8"?>
+<p:sld xmlns:a="http://schemas.openxmlformats.org/drawingml/2006/main" xmlns:r="http://schemas.openxmlformats.org/officeDocument/2006/relationships" xmlns:p="http://schemas.openxmlformats.org/presentationml/2006/main">
+  <p:cSld>
+    <p:spTree>
+      <p:nvGrpSpPr>
+        <p:cNvPr id="1" name=""/>
+        <p:cNvGrpSpPr/>
+        <p:nvPr/>
+      </p:nvGrpSpPr>
+      <p:grpSpPr>
+        <a:xfrm>
+          <a:off x="0" y="0"/>
+          <a:ext cx="0" cy="0"/>
+          <a:chOff x="0" y="0"/>
+          <a:chExt cx="0" cy="0"/>
+        </a:xfrm>
+      </p:grpSpPr>
+      <p:sp>
+        <p:nvSpPr>
+          <p:cNvPr id="2" name="Text Box 2">
+            <a:extLst>
+              <a:ext uri="{FF2B5EF4-FFF2-40B4-BE49-F238E27FC236}">
+                <a16:creationId xmlns:a16="http://schemas.microsoft.com/office/drawing/2014/main" id="{6D7650AE-C4F3-47FE-B940-CE2F45073856}"/>
+              </a:ext>
+            </a:extLst>
+          </p:cNvPr>
+          <p:cNvSpPr txBox="1">
+            <a:spLocks noChangeArrowheads="1"/>
+          </p:cNvSpPr>
+          <p:nvPr/>
+        </p:nvSpPr>
+        <p:spPr bwMode="auto">
+          <a:xfrm>
+            <a:off x="251520" y="404664"/>
+            <a:ext cx="6310313" cy="396875"/>
+          </a:xfrm>
+          <a:prstGeom prst="rect">
+            <a:avLst/>
+          </a:prstGeom>
+          <a:noFill/>
+          <a:ln>
+            <a:noFill/>
+          </a:ln>
+          <a:extLst>
+            <a:ext uri="{909E8E84-426E-40DD-AFC4-6F175D3DCCD1}">
+              <a14:hiddenFill xmlns:a14="http://schemas.microsoft.com/office/drawing/2010/main">
+                <a:solidFill>
+                  <a:srgbClr val="FFFFFF"/>
+                </a:solidFill>
+              </a14:hiddenFill>
+            </a:ext>
+            <a:ext uri="{91240B29-F687-4F45-9708-019B960494DF}">
+              <a14:hiddenLine xmlns:a14="http://schemas.microsoft.com/office/drawing/2010/main" w="9525">
+                <a:solidFill>
+                  <a:srgbClr val="000000"/>
+                </a:solidFill>
+                <a:miter lim="800000"/>
+                <a:headEnd/>
+                <a:tailEnd/>
+              </a14:hiddenLine>
+            </a:ext>
+          </a:extLst>
+        </p:spPr>
+        <p:txBody>
+          <a:bodyPr>
+            <a:spAutoFit/>
+          </a:bodyPr>
+          <a:lstStyle>
+            <a:lvl1pPr>
+              <a:spcBef>
+                <a:spcPct val="20000"/>
+              </a:spcBef>
+              <a:buChar char="•"/>
+              <a:defRPr sz="3200">
+                <a:solidFill>
+                  <a:schemeClr val="tx1"/>
+                </a:solidFill>
+                <a:latin typeface="Times New Roman" panose="02020603050405020304" pitchFamily="18" charset="0"/>
+              </a:defRPr>
+            </a:lvl1pPr>
+            <a:lvl2pPr marL="742950" indent="-285750">
+              <a:spcBef>
+                <a:spcPct val="20000"/>
+              </a:spcBef>
+              <a:buChar char="–"/>
+              <a:defRPr sz="2800">
+                <a:solidFill>
+                  <a:schemeClr val="tx1"/>
+                </a:solidFill>
+                <a:latin typeface="Times New Roman" panose="02020603050405020304" pitchFamily="18" charset="0"/>
+              </a:defRPr>
+            </a:lvl2pPr>
+            <a:lvl3pPr marL="1143000" indent="-228600">
+              <a:spcBef>
+                <a:spcPct val="20000"/>
+              </a:spcBef>
+              <a:buChar char="•"/>
+              <a:defRPr sz="2400">
+                <a:solidFill>
+                  <a:schemeClr val="tx1"/>
+                </a:solidFill>
+                <a:latin typeface="Times New Roman" panose="02020603050405020304" pitchFamily="18" charset="0"/>
+              </a:defRPr>
+            </a:lvl3pPr>
+            <a:lvl4pPr marL="1600200" indent="-228600">
+              <a:spcBef>
+                <a:spcPct val="20000"/>
+              </a:spcBef>
+              <a:buChar char="–"/>
+              <a:defRPr sz="2000">
+                <a:solidFill>
+                  <a:schemeClr val="tx1"/>
+                </a:solidFill>
+                <a:latin typeface="Times New Roman" panose="02020603050405020304" pitchFamily="18" charset="0"/>
+              </a:defRPr>
+            </a:lvl4pPr>
+            <a:lvl5pPr marL="2057400" indent="-228600">
+              <a:spcBef>
+                <a:spcPct val="20000"/>
+              </a:spcBef>
+              <a:buChar char="»"/>
+              <a:defRPr sz="2000">
+                <a:solidFill>
+                  <a:schemeClr val="tx1"/>
+                </a:solidFill>
+                <a:latin typeface="Times New Roman" panose="02020603050405020304" pitchFamily="18" charset="0"/>
+              </a:defRPr>
+            </a:lvl5pPr>
+            <a:lvl6pPr marL="2514600" indent="-228600" eaLnBrk="0" fontAlgn="base" hangingPunct="0">
+              <a:spcBef>
+                <a:spcPct val="20000"/>
+              </a:spcBef>
+              <a:spcAft>
+                <a:spcPct val="0"/>
+              </a:spcAft>
+              <a:buChar char="»"/>
+              <a:defRPr sz="2000">
+                <a:solidFill>
+                  <a:schemeClr val="tx1"/>
+                </a:solidFill>
+                <a:latin typeface="Times New Roman" panose="02020603050405020304" pitchFamily="18" charset="0"/>
+              </a:defRPr>
+            </a:lvl6pPr>
+            <a:lvl7pPr marL="2971800" indent="-228600" eaLnBrk="0" fontAlgn="base" hangingPunct="0">
+              <a:spcBef>
+                <a:spcPct val="20000"/>
+              </a:spcBef>
+              <a:spcAft>
+                <a:spcPct val="0"/>
+              </a:spcAft>
+              <a:buChar char="»"/>
+              <a:defRPr sz="2000">
+                <a:solidFill>
+                  <a:schemeClr val="tx1"/>
+                </a:solidFill>
+                <a:latin typeface="Times New Roman" panose="02020603050405020304" pitchFamily="18" charset="0"/>
+              </a:defRPr>
+            </a:lvl7pPr>
+            <a:lvl8pPr marL="3429000" indent="-228600" eaLnBrk="0" fontAlgn="base" hangingPunct="0">
+              <a:spcBef>
+                <a:spcPct val="20000"/>
+              </a:spcBef>
+              <a:spcAft>
+                <a:spcPct val="0"/>
+              </a:spcAft>
+              <a:buChar char="»"/>
+              <a:defRPr sz="2000">
+                <a:solidFill>
+                  <a:schemeClr val="tx1"/>
+                </a:solidFill>
+                <a:latin typeface="Times New Roman" panose="02020603050405020304" pitchFamily="18" charset="0"/>
+              </a:defRPr>
+            </a:lvl8pPr>
+            <a:lvl9pPr marL="3886200" indent="-228600" eaLnBrk="0" fontAlgn="base" hangingPunct="0">
+              <a:spcBef>
+                <a:spcPct val="20000"/>
+              </a:spcBef>
+              <a:spcAft>
+                <a:spcPct val="0"/>
+              </a:spcAft>
+              <a:buChar char="»"/>
+              <a:defRPr sz="2000">
+                <a:solidFill>
+                  <a:schemeClr val="tx1"/>
+                </a:solidFill>
+                <a:latin typeface="Times New Roman" panose="02020603050405020304" pitchFamily="18" charset="0"/>
+              </a:defRPr>
+            </a:lvl9pPr>
+          </a:lstStyle>
+          <a:p>
+            <a:pPr eaLnBrk="1" hangingPunct="1">
+              <a:spcBef>
+                <a:spcPct val="50000"/>
+              </a:spcBef>
+              <a:buFontTx/>
+              <a:buNone/>
+            </a:pPr>
+            <a:r>
+              <a:rPr lang="es-ES" altLang="ca-ES" sz="2000" dirty="0" err="1">
+                <a:solidFill>
+                  <a:srgbClr val="FFFF99"/>
+                </a:solidFill>
+                <a:latin typeface="Swis721 Ex BT" pitchFamily="34" charset="0"/>
+              </a:rPr>
+              <a:t>Javascript</a:t>
+            </a:r>
+            <a:r>
+              <a:rPr lang="es-ES" altLang="ca-ES" sz="2000" dirty="0">
+                <a:solidFill>
+                  <a:srgbClr val="FFFF99"/>
+                </a:solidFill>
+                <a:latin typeface="Swis721 Ex BT" pitchFamily="34" charset="0"/>
+              </a:rPr>
+              <a:t> puro o </a:t>
+            </a:r>
+            <a:r>
+              <a:rPr lang="es-ES" altLang="ca-ES" sz="2000" dirty="0" err="1">
+                <a:solidFill>
+                  <a:srgbClr val="FFFF99"/>
+                </a:solidFill>
+                <a:latin typeface="Swis721 Ex BT" pitchFamily="34" charset="0"/>
+              </a:rPr>
+              <a:t>Vanilla</a:t>
+            </a:r>
+            <a:r>
+              <a:rPr lang="es-ES" altLang="ca-ES" sz="2000" dirty="0">
+                <a:solidFill>
+                  <a:srgbClr val="FFFF99"/>
+                </a:solidFill>
+                <a:latin typeface="Swis721 Ex BT" pitchFamily="34" charset="0"/>
+              </a:rPr>
+              <a:t> </a:t>
+            </a:r>
+            <a:r>
+              <a:rPr lang="es-ES" altLang="ca-ES" sz="2000" dirty="0" err="1">
+                <a:solidFill>
+                  <a:srgbClr val="FFFF99"/>
+                </a:solidFill>
+                <a:latin typeface="Swis721 Ex BT" pitchFamily="34" charset="0"/>
+              </a:rPr>
+              <a:t>Javascript</a:t>
+            </a:r>
+            <a:endParaRPr lang="es-ES" altLang="ca-ES" sz="2000" dirty="0">
+              <a:solidFill>
+                <a:srgbClr val="FFFF99"/>
+              </a:solidFill>
+              <a:latin typeface="Swis721 Ex BT" pitchFamily="34" charset="0"/>
+            </a:endParaRPr>
+          </a:p>
+        </p:txBody>
+      </p:sp>
+      <p:sp>
+        <p:nvSpPr>
+          <p:cNvPr id="3" name="Rectángulo 2">
+            <a:extLst>
+              <a:ext uri="{FF2B5EF4-FFF2-40B4-BE49-F238E27FC236}">
+                <a16:creationId xmlns:a16="http://schemas.microsoft.com/office/drawing/2014/main" id="{C20349E6-0793-4C7C-A7B9-EC587CCAA0FF}"/>
+              </a:ext>
+            </a:extLst>
+          </p:cNvPr>
+          <p:cNvSpPr/>
+          <p:nvPr/>
+        </p:nvSpPr>
+        <p:spPr>
+          <a:xfrm>
+            <a:off x="3491880" y="5877272"/>
+            <a:ext cx="2791149" cy="369332"/>
+          </a:xfrm>
+          <a:prstGeom prst="rect">
+            <a:avLst/>
+          </a:prstGeom>
+        </p:spPr>
+        <p:txBody>
+          <a:bodyPr wrap="none">
+            <a:spAutoFit/>
+          </a:bodyPr>
+          <a:lstStyle/>
+          <a:p>
+            <a:r>
+              <a:rPr lang="es-ES" dirty="0">
+                <a:hlinkClick r:id="rId2"/>
+              </a:rPr>
+              <a:t>http://vanilla-js.com/</a:t>
+            </a:r>
+            <a:r>
+              <a:rPr lang="es-ES" dirty="0"/>
+              <a:t>(*)</a:t>
+            </a:r>
+          </a:p>
+        </p:txBody>
+      </p:sp>
+      <p:sp>
+        <p:nvSpPr>
+          <p:cNvPr id="4" name="Rectángulo 3">
+            <a:extLst>
+              <a:ext uri="{FF2B5EF4-FFF2-40B4-BE49-F238E27FC236}">
+                <a16:creationId xmlns:a16="http://schemas.microsoft.com/office/drawing/2014/main" id="{7C98AA02-7354-432A-8000-3B4E6C2DED80}"/>
+              </a:ext>
+            </a:extLst>
+          </p:cNvPr>
+          <p:cNvSpPr/>
+          <p:nvPr/>
+        </p:nvSpPr>
+        <p:spPr>
+          <a:xfrm>
+            <a:off x="827584" y="1484784"/>
+            <a:ext cx="7632848" cy="923330"/>
+          </a:xfrm>
+          <a:prstGeom prst="rect">
+            <a:avLst/>
+          </a:prstGeom>
+        </p:spPr>
+        <p:txBody>
+          <a:bodyPr wrap="square">
+            <a:spAutoFit/>
+          </a:bodyPr>
+          <a:lstStyle/>
+          <a:p>
+            <a:r>
+              <a:rPr lang="en-US" dirty="0"/>
+              <a:t>The terms Vanilla JavaScript and Vanilla JS refer to JavaScript not extended by any frameworks or additional libraries. Scripts written in Vanilla JS are plain JavaScript code.</a:t>
+            </a:r>
+            <a:endParaRPr lang="es-ES" dirty="0"/>
+          </a:p>
+        </p:txBody>
+      </p:sp>
+      <p:sp>
+        <p:nvSpPr>
+          <p:cNvPr id="5" name="CuadroTexto 4">
+            <a:extLst>
+              <a:ext uri="{FF2B5EF4-FFF2-40B4-BE49-F238E27FC236}">
+                <a16:creationId xmlns:a16="http://schemas.microsoft.com/office/drawing/2014/main" id="{C7812A46-27F2-44F5-943C-392D4AEA310D}"/>
+              </a:ext>
+            </a:extLst>
+          </p:cNvPr>
+          <p:cNvSpPr txBox="1"/>
+          <p:nvPr/>
+        </p:nvSpPr>
+        <p:spPr>
+          <a:xfrm>
+            <a:off x="827584" y="3284984"/>
+            <a:ext cx="7146508" cy="1200329"/>
+          </a:xfrm>
+          <a:prstGeom prst="rect">
+            <a:avLst/>
+          </a:prstGeom>
+          <a:noFill/>
+        </p:spPr>
+        <p:txBody>
+          <a:bodyPr wrap="none" rtlCol="0">
+            <a:spAutoFit/>
+          </a:bodyPr>
+          <a:lstStyle/>
+          <a:p>
+            <a:r>
+              <a:rPr lang="es-ES" dirty="0" err="1"/>
+              <a:t>Vanilla</a:t>
+            </a:r>
+            <a:r>
+              <a:rPr lang="es-ES" dirty="0"/>
+              <a:t> JS es una iniciativa, en forma de </a:t>
+            </a:r>
+            <a:r>
+              <a:rPr lang="es-ES" dirty="0" err="1"/>
+              <a:t>framework</a:t>
+            </a:r>
+            <a:r>
+              <a:rPr lang="es-ES" dirty="0"/>
+              <a:t>(*) que</a:t>
+            </a:r>
+          </a:p>
+          <a:p>
+            <a:r>
+              <a:rPr lang="es-ES" dirty="0"/>
+              <a:t> intenta enseñar las grandes ventajas de no usar </a:t>
+            </a:r>
+            <a:r>
+              <a:rPr lang="es-ES" dirty="0" err="1"/>
+              <a:t>frameworks</a:t>
+            </a:r>
+            <a:r>
+              <a:rPr lang="es-ES" dirty="0"/>
+              <a:t> y</a:t>
+            </a:r>
+          </a:p>
+          <a:p>
+            <a:r>
+              <a:rPr lang="es-ES" dirty="0"/>
+              <a:t> potenciar nuestras aplicaciones sin necesidad </a:t>
+            </a:r>
+          </a:p>
+          <a:p>
+            <a:r>
+              <a:rPr lang="es-ES" dirty="0"/>
+              <a:t>de añadir grandes archivos extra.</a:t>
+            </a:r>
+          </a:p>
+        </p:txBody>
+      </p:sp>
+    </p:spTree>
+    <p:extLst>
+      <p:ext uri="{BB962C8B-B14F-4D97-AF65-F5344CB8AC3E}">
+        <p14:creationId xmlns:p14="http://schemas.microsoft.com/office/powerpoint/2010/main" val="4104276394"/>
+      </p:ext>
+    </p:extLst>
+  </p:cSld>
+  <p:clrMapOvr>
+    <a:masterClrMapping/>
+  </p:clrMapOvr>
+</p:sld>
+</file>
+
 <file path=ppt/slides/slide2.xml><?xml version="1.0" encoding="utf-8"?>
 <p:sld xmlns:a="http://schemas.openxmlformats.org/drawingml/2006/main" xmlns:r="http://schemas.openxmlformats.org/officeDocument/2006/relationships" xmlns:p="http://schemas.openxmlformats.org/presentationml/2006/main">
   <p:cSld>
@@ -7116,7 +7791,7 @@
         </p:blipFill>
         <p:spPr>
           <a:xfrm>
-            <a:off x="323528" y="2795913"/>
+            <a:off x="474088" y="4710367"/>
             <a:ext cx="2808312" cy="1474364"/>
           </a:xfrm>
           <a:prstGeom prst="rect">
@@ -7138,7 +7813,7 @@
         </p:nvSpPr>
         <p:spPr>
           <a:xfrm>
-            <a:off x="3641545" y="3163763"/>
+            <a:off x="3641545" y="5262883"/>
             <a:ext cx="5187639" cy="369332"/>
           </a:xfrm>
           <a:prstGeom prst="rect">
@@ -7189,7 +7864,7 @@
         </p:blipFill>
         <p:spPr>
           <a:xfrm>
-            <a:off x="404210" y="4922221"/>
+            <a:off x="547543" y="2849380"/>
             <a:ext cx="2734857" cy="1367429"/>
           </a:xfrm>
           <a:prstGeom prst="rect">
@@ -7211,7 +7886,7 @@
         </p:nvSpPr>
         <p:spPr>
           <a:xfrm>
-            <a:off x="4067944" y="5144755"/>
+            <a:off x="3995936" y="3348428"/>
             <a:ext cx="4293163" cy="369332"/>
           </a:xfrm>
           <a:prstGeom prst="rect">
@@ -7892,7 +8567,7 @@
         <p:spPr>
           <a:xfrm>
             <a:off x="1259632" y="4941168"/>
-            <a:ext cx="6147837" cy="646331"/>
+            <a:ext cx="6970178" cy="646331"/>
           </a:xfrm>
           <a:prstGeom prst="rect">
             <a:avLst/>
@@ -7915,7 +8590,7 @@
             </a:r>
             <a:r>
               <a:rPr lang="es-ES" dirty="0"/>
-              <a:t> i podemos realizar muchos </a:t>
+              <a:t> (+ 250) i podemos realizar muchos </a:t>
             </a:r>
           </a:p>
           <a:p>
@@ -7956,6 +8631,343 @@
           <a:chExt cx="0" cy="0"/>
         </a:xfrm>
       </p:grpSpPr>
+      <p:pic>
+        <p:nvPicPr>
+          <p:cNvPr id="3" name="Imagen 2">
+            <a:extLst>
+              <a:ext uri="{FF2B5EF4-FFF2-40B4-BE49-F238E27FC236}">
+                <a16:creationId xmlns:a16="http://schemas.microsoft.com/office/drawing/2014/main" id="{B50DF2EB-C259-40F7-90E9-36793C82ED59}"/>
+              </a:ext>
+            </a:extLst>
+          </p:cNvPr>
+          <p:cNvPicPr>
+            <a:picLocks noChangeAspect="1"/>
+          </p:cNvPicPr>
+          <p:nvPr/>
+        </p:nvPicPr>
+        <p:blipFill>
+          <a:blip r:embed="rId2"/>
+          <a:stretch>
+            <a:fillRect/>
+          </a:stretch>
+        </p:blipFill>
+        <p:spPr>
+          <a:xfrm>
+            <a:off x="395536" y="548680"/>
+            <a:ext cx="3176985" cy="842303"/>
+          </a:xfrm>
+          <a:prstGeom prst="rect">
+            <a:avLst/>
+          </a:prstGeom>
+        </p:spPr>
+      </p:pic>
+      <p:pic>
+        <p:nvPicPr>
+          <p:cNvPr id="6" name="Picture 5">
+            <a:extLst>
+              <a:ext uri="{FF2B5EF4-FFF2-40B4-BE49-F238E27FC236}">
+                <a16:creationId xmlns:a16="http://schemas.microsoft.com/office/drawing/2014/main" id="{D0A534B2-592B-4120-AA78-B916C770C32F}"/>
+              </a:ext>
+            </a:extLst>
+          </p:cNvPr>
+          <p:cNvPicPr>
+            <a:picLocks noChangeAspect="1"/>
+          </p:cNvPicPr>
+          <p:nvPr/>
+        </p:nvPicPr>
+        <p:blipFill>
+          <a:blip r:embed="rId3"/>
+          <a:stretch>
+            <a:fillRect/>
+          </a:stretch>
+        </p:blipFill>
+        <p:spPr>
+          <a:xfrm>
+            <a:off x="6264198" y="487564"/>
+            <a:ext cx="2484266" cy="2499000"/>
+          </a:xfrm>
+          <a:prstGeom prst="rect">
+            <a:avLst/>
+          </a:prstGeom>
+        </p:spPr>
+      </p:pic>
+      <p:pic>
+        <p:nvPicPr>
+          <p:cNvPr id="7" name="Picture 6">
+            <a:extLst>
+              <a:ext uri="{FF2B5EF4-FFF2-40B4-BE49-F238E27FC236}">
+                <a16:creationId xmlns:a16="http://schemas.microsoft.com/office/drawing/2014/main" id="{6EC69661-C5EE-4D0C-A3B5-760B5B054F21}"/>
+              </a:ext>
+            </a:extLst>
+          </p:cNvPr>
+          <p:cNvPicPr>
+            <a:picLocks noChangeAspect="1"/>
+          </p:cNvPicPr>
+          <p:nvPr/>
+        </p:nvPicPr>
+        <p:blipFill>
+          <a:blip r:embed="rId4"/>
+          <a:stretch>
+            <a:fillRect/>
+          </a:stretch>
+        </p:blipFill>
+        <p:spPr>
+          <a:xfrm>
+            <a:off x="767406" y="1737064"/>
+            <a:ext cx="2940498" cy="1839188"/>
+          </a:xfrm>
+          <a:prstGeom prst="rect">
+            <a:avLst/>
+          </a:prstGeom>
+        </p:spPr>
+      </p:pic>
+      <p:pic>
+        <p:nvPicPr>
+          <p:cNvPr id="8" name="Picture 7">
+            <a:extLst>
+              <a:ext uri="{FF2B5EF4-FFF2-40B4-BE49-F238E27FC236}">
+                <a16:creationId xmlns:a16="http://schemas.microsoft.com/office/drawing/2014/main" id="{59220C14-F7B2-4EDF-98CE-D66F9DD070C0}"/>
+              </a:ext>
+            </a:extLst>
+          </p:cNvPr>
+          <p:cNvPicPr>
+            <a:picLocks noChangeAspect="1"/>
+          </p:cNvPicPr>
+          <p:nvPr/>
+        </p:nvPicPr>
+        <p:blipFill>
+          <a:blip r:embed="rId5"/>
+          <a:stretch>
+            <a:fillRect/>
+          </a:stretch>
+        </p:blipFill>
+        <p:spPr>
+          <a:xfrm>
+            <a:off x="667806" y="4005064"/>
+            <a:ext cx="3394353" cy="2373965"/>
+          </a:xfrm>
+          <a:prstGeom prst="rect">
+            <a:avLst/>
+          </a:prstGeom>
+        </p:spPr>
+      </p:pic>
+      <p:pic>
+        <p:nvPicPr>
+          <p:cNvPr id="12" name="Picture 11">
+            <a:extLst>
+              <a:ext uri="{FF2B5EF4-FFF2-40B4-BE49-F238E27FC236}">
+                <a16:creationId xmlns:a16="http://schemas.microsoft.com/office/drawing/2014/main" id="{833F799C-0C50-4029-AD86-A461062E85AE}"/>
+              </a:ext>
+            </a:extLst>
+          </p:cNvPr>
+          <p:cNvPicPr>
+            <a:picLocks noChangeAspect="1"/>
+          </p:cNvPicPr>
+          <p:nvPr/>
+        </p:nvPicPr>
+        <p:blipFill>
+          <a:blip r:embed="rId6"/>
+          <a:stretch>
+            <a:fillRect/>
+          </a:stretch>
+        </p:blipFill>
+        <p:spPr>
+          <a:xfrm>
+            <a:off x="4936767" y="4362395"/>
+            <a:ext cx="3565080" cy="2088232"/>
+          </a:xfrm>
+          <a:prstGeom prst="rect">
+            <a:avLst/>
+          </a:prstGeom>
+        </p:spPr>
+      </p:pic>
+      <p:pic>
+        <p:nvPicPr>
+          <p:cNvPr id="13" name="Picture 12">
+            <a:extLst>
+              <a:ext uri="{FF2B5EF4-FFF2-40B4-BE49-F238E27FC236}">
+                <a16:creationId xmlns:a16="http://schemas.microsoft.com/office/drawing/2014/main" id="{907280C1-B060-44E3-9979-4EDAF54B3376}"/>
+              </a:ext>
+            </a:extLst>
+          </p:cNvPr>
+          <p:cNvPicPr>
+            <a:picLocks noChangeAspect="1"/>
+          </p:cNvPicPr>
+          <p:nvPr/>
+        </p:nvPicPr>
+        <p:blipFill>
+          <a:blip r:embed="rId7"/>
+          <a:stretch>
+            <a:fillRect/>
+          </a:stretch>
+        </p:blipFill>
+        <p:spPr>
+          <a:xfrm>
+            <a:off x="3808835" y="2420888"/>
+            <a:ext cx="2389945" cy="1504131"/>
+          </a:xfrm>
+          <a:prstGeom prst="rect">
+            <a:avLst/>
+          </a:prstGeom>
+        </p:spPr>
+      </p:pic>
+    </p:spTree>
+    <p:extLst>
+      <p:ext uri="{BB962C8B-B14F-4D97-AF65-F5344CB8AC3E}">
+        <p14:creationId xmlns:p14="http://schemas.microsoft.com/office/powerpoint/2010/main" val="201779113"/>
+      </p:ext>
+    </p:extLst>
+  </p:cSld>
+  <p:clrMapOvr>
+    <a:masterClrMapping/>
+  </p:clrMapOvr>
+</p:sld>
+</file>
+
+<file path=ppt/slides/slide7.xml><?xml version="1.0" encoding="utf-8"?>
+<p:sld xmlns:a="http://schemas.openxmlformats.org/drawingml/2006/main" xmlns:r="http://schemas.openxmlformats.org/officeDocument/2006/relationships" xmlns:p="http://schemas.openxmlformats.org/presentationml/2006/main">
+  <p:cSld>
+    <p:spTree>
+      <p:nvGrpSpPr>
+        <p:cNvPr id="1" name=""/>
+        <p:cNvGrpSpPr/>
+        <p:nvPr/>
+      </p:nvGrpSpPr>
+      <p:grpSpPr>
+        <a:xfrm>
+          <a:off x="0" y="0"/>
+          <a:ext cx="0" cy="0"/>
+          <a:chOff x="0" y="0"/>
+          <a:chExt cx="0" cy="0"/>
+        </a:xfrm>
+      </p:grpSpPr>
+      <p:pic>
+        <p:nvPicPr>
+          <p:cNvPr id="3" name="Imagen 2">
+            <a:extLst>
+              <a:ext uri="{FF2B5EF4-FFF2-40B4-BE49-F238E27FC236}">
+                <a16:creationId xmlns:a16="http://schemas.microsoft.com/office/drawing/2014/main" id="{B50DF2EB-C259-40F7-90E9-36793C82ED59}"/>
+              </a:ext>
+            </a:extLst>
+          </p:cNvPr>
+          <p:cNvPicPr>
+            <a:picLocks noChangeAspect="1"/>
+          </p:cNvPicPr>
+          <p:nvPr/>
+        </p:nvPicPr>
+        <p:blipFill>
+          <a:blip r:embed="rId2"/>
+          <a:stretch>
+            <a:fillRect/>
+          </a:stretch>
+        </p:blipFill>
+        <p:spPr>
+          <a:xfrm>
+            <a:off x="395536" y="404664"/>
+            <a:ext cx="3176985" cy="842303"/>
+          </a:xfrm>
+          <a:prstGeom prst="rect">
+            <a:avLst/>
+          </a:prstGeom>
+        </p:spPr>
+      </p:pic>
+      <p:pic>
+        <p:nvPicPr>
+          <p:cNvPr id="2" name="Picture 1">
+            <a:extLst>
+              <a:ext uri="{FF2B5EF4-FFF2-40B4-BE49-F238E27FC236}">
+                <a16:creationId xmlns:a16="http://schemas.microsoft.com/office/drawing/2014/main" id="{E8D48270-D795-45EC-AC38-35CE812D3A97}"/>
+              </a:ext>
+            </a:extLst>
+          </p:cNvPr>
+          <p:cNvPicPr>
+            <a:picLocks noChangeAspect="1"/>
+          </p:cNvPicPr>
+          <p:nvPr/>
+        </p:nvPicPr>
+        <p:blipFill>
+          <a:blip r:embed="rId3"/>
+          <a:stretch>
+            <a:fillRect/>
+          </a:stretch>
+        </p:blipFill>
+        <p:spPr>
+          <a:xfrm>
+            <a:off x="1691680" y="1276802"/>
+            <a:ext cx="5779671" cy="5167182"/>
+          </a:xfrm>
+          <a:prstGeom prst="rect">
+            <a:avLst/>
+          </a:prstGeom>
+        </p:spPr>
+      </p:pic>
+      <p:sp>
+        <p:nvSpPr>
+          <p:cNvPr id="4" name="Rectangle 3">
+            <a:extLst>
+              <a:ext uri="{FF2B5EF4-FFF2-40B4-BE49-F238E27FC236}">
+                <a16:creationId xmlns:a16="http://schemas.microsoft.com/office/drawing/2014/main" id="{64A6FA46-E313-484E-AF91-616AB37046F5}"/>
+              </a:ext>
+            </a:extLst>
+          </p:cNvPr>
+          <p:cNvSpPr/>
+          <p:nvPr/>
+        </p:nvSpPr>
+        <p:spPr>
+          <a:xfrm>
+            <a:off x="5292080" y="404664"/>
+            <a:ext cx="2515432" cy="369332"/>
+          </a:xfrm>
+          <a:prstGeom prst="rect">
+            <a:avLst/>
+          </a:prstGeom>
+        </p:spPr>
+        <p:txBody>
+          <a:bodyPr wrap="none">
+            <a:spAutoFit/>
+          </a:bodyPr>
+          <a:lstStyle/>
+          <a:p>
+            <a:r>
+              <a:rPr lang="ca-ES" dirty="0">
+                <a:hlinkClick r:id="rId4"/>
+              </a:rPr>
+              <a:t>https://leafletjs.com/</a:t>
+            </a:r>
+            <a:endParaRPr lang="ca-ES" dirty="0"/>
+          </a:p>
+        </p:txBody>
+      </p:sp>
+    </p:spTree>
+    <p:extLst>
+      <p:ext uri="{BB962C8B-B14F-4D97-AF65-F5344CB8AC3E}">
+        <p14:creationId xmlns:p14="http://schemas.microsoft.com/office/powerpoint/2010/main" val="1100038174"/>
+      </p:ext>
+    </p:extLst>
+  </p:cSld>
+  <p:clrMapOvr>
+    <a:masterClrMapping/>
+  </p:clrMapOvr>
+</p:sld>
+</file>
+
+<file path=ppt/slides/slide8.xml><?xml version="1.0" encoding="utf-8"?>
+<p:sld xmlns:a="http://schemas.openxmlformats.org/drawingml/2006/main" xmlns:r="http://schemas.openxmlformats.org/officeDocument/2006/relationships" xmlns:p="http://schemas.openxmlformats.org/presentationml/2006/main">
+  <p:cSld>
+    <p:spTree>
+      <p:nvGrpSpPr>
+        <p:cNvPr id="1" name=""/>
+        <p:cNvGrpSpPr/>
+        <p:nvPr/>
+      </p:nvGrpSpPr>
+      <p:grpSpPr>
+        <a:xfrm>
+          <a:off x="0" y="0"/>
+          <a:ext cx="0" cy="0"/>
+          <a:chOff x="0" y="0"/>
+          <a:chExt cx="0" cy="0"/>
+        </a:xfrm>
+      </p:grpSpPr>
       <p:sp>
         <p:nvSpPr>
           <p:cNvPr id="5" name="Text Box 2">
@@ -8167,7 +9179,7 @@
 </p:sld>
 </file>
 
-<file path=ppt/slides/slide7.xml><?xml version="1.0" encoding="utf-8"?>
+<file path=ppt/slides/slide9.xml><?xml version="1.0" encoding="utf-8"?>
 <p:sld xmlns:a="http://schemas.openxmlformats.org/drawingml/2006/main" xmlns:r="http://schemas.openxmlformats.org/officeDocument/2006/relationships" xmlns:p="http://schemas.openxmlformats.org/presentationml/2006/main">
   <p:cSld>
     <p:spTree>
@@ -8419,679 +9431,6 @@
     <p:extLst>
       <p:ext uri="{BB962C8B-B14F-4D97-AF65-F5344CB8AC3E}">
         <p14:creationId xmlns:p14="http://schemas.microsoft.com/office/powerpoint/2010/main" val="734073753"/>
-      </p:ext>
-    </p:extLst>
-  </p:cSld>
-  <p:clrMapOvr>
-    <a:masterClrMapping/>
-  </p:clrMapOvr>
-</p:sld>
-</file>
-
-<file path=ppt/slides/slide8.xml><?xml version="1.0" encoding="utf-8"?>
-<p:sld xmlns:a="http://schemas.openxmlformats.org/drawingml/2006/main" xmlns:r="http://schemas.openxmlformats.org/officeDocument/2006/relationships" xmlns:p="http://schemas.openxmlformats.org/presentationml/2006/main">
-  <p:cSld>
-    <p:spTree>
-      <p:nvGrpSpPr>
-        <p:cNvPr id="1" name=""/>
-        <p:cNvGrpSpPr/>
-        <p:nvPr/>
-      </p:nvGrpSpPr>
-      <p:grpSpPr>
-        <a:xfrm>
-          <a:off x="0" y="0"/>
-          <a:ext cx="0" cy="0"/>
-          <a:chOff x="0" y="0"/>
-          <a:chExt cx="0" cy="0"/>
-        </a:xfrm>
-      </p:grpSpPr>
-      <p:sp>
-        <p:nvSpPr>
-          <p:cNvPr id="2" name="Text Box 2">
-            <a:extLst>
-              <a:ext uri="{FF2B5EF4-FFF2-40B4-BE49-F238E27FC236}">
-                <a16:creationId xmlns:a16="http://schemas.microsoft.com/office/drawing/2014/main" id="{6D7650AE-C4F3-47FE-B940-CE2F45073856}"/>
-              </a:ext>
-            </a:extLst>
-          </p:cNvPr>
-          <p:cNvSpPr txBox="1">
-            <a:spLocks noChangeArrowheads="1"/>
-          </p:cNvSpPr>
-          <p:nvPr/>
-        </p:nvSpPr>
-        <p:spPr bwMode="auto">
-          <a:xfrm>
-            <a:off x="323528" y="404664"/>
-            <a:ext cx="6310313" cy="396875"/>
-          </a:xfrm>
-          <a:prstGeom prst="rect">
-            <a:avLst/>
-          </a:prstGeom>
-          <a:noFill/>
-          <a:ln>
-            <a:noFill/>
-          </a:ln>
-          <a:extLst>
-            <a:ext uri="{909E8E84-426E-40DD-AFC4-6F175D3DCCD1}">
-              <a14:hiddenFill xmlns:a14="http://schemas.microsoft.com/office/drawing/2010/main">
-                <a:solidFill>
-                  <a:srgbClr val="FFFFFF"/>
-                </a:solidFill>
-              </a14:hiddenFill>
-            </a:ext>
-            <a:ext uri="{91240B29-F687-4F45-9708-019B960494DF}">
-              <a14:hiddenLine xmlns:a14="http://schemas.microsoft.com/office/drawing/2010/main" w="9525">
-                <a:solidFill>
-                  <a:srgbClr val="000000"/>
-                </a:solidFill>
-                <a:miter lim="800000"/>
-                <a:headEnd/>
-                <a:tailEnd/>
-              </a14:hiddenLine>
-            </a:ext>
-          </a:extLst>
-        </p:spPr>
-        <p:txBody>
-          <a:bodyPr>
-            <a:spAutoFit/>
-          </a:bodyPr>
-          <a:lstStyle>
-            <a:lvl1pPr>
-              <a:spcBef>
-                <a:spcPct val="20000"/>
-              </a:spcBef>
-              <a:buChar char="•"/>
-              <a:defRPr sz="3200">
-                <a:solidFill>
-                  <a:schemeClr val="tx1"/>
-                </a:solidFill>
-                <a:latin typeface="Times New Roman" panose="02020603050405020304" pitchFamily="18" charset="0"/>
-              </a:defRPr>
-            </a:lvl1pPr>
-            <a:lvl2pPr marL="742950" indent="-285750">
-              <a:spcBef>
-                <a:spcPct val="20000"/>
-              </a:spcBef>
-              <a:buChar char="–"/>
-              <a:defRPr sz="2800">
-                <a:solidFill>
-                  <a:schemeClr val="tx1"/>
-                </a:solidFill>
-                <a:latin typeface="Times New Roman" panose="02020603050405020304" pitchFamily="18" charset="0"/>
-              </a:defRPr>
-            </a:lvl2pPr>
-            <a:lvl3pPr marL="1143000" indent="-228600">
-              <a:spcBef>
-                <a:spcPct val="20000"/>
-              </a:spcBef>
-              <a:buChar char="•"/>
-              <a:defRPr sz="2400">
-                <a:solidFill>
-                  <a:schemeClr val="tx1"/>
-                </a:solidFill>
-                <a:latin typeface="Times New Roman" panose="02020603050405020304" pitchFamily="18" charset="0"/>
-              </a:defRPr>
-            </a:lvl3pPr>
-            <a:lvl4pPr marL="1600200" indent="-228600">
-              <a:spcBef>
-                <a:spcPct val="20000"/>
-              </a:spcBef>
-              <a:buChar char="–"/>
-              <a:defRPr sz="2000">
-                <a:solidFill>
-                  <a:schemeClr val="tx1"/>
-                </a:solidFill>
-                <a:latin typeface="Times New Roman" panose="02020603050405020304" pitchFamily="18" charset="0"/>
-              </a:defRPr>
-            </a:lvl4pPr>
-            <a:lvl5pPr marL="2057400" indent="-228600">
-              <a:spcBef>
-                <a:spcPct val="20000"/>
-              </a:spcBef>
-              <a:buChar char="»"/>
-              <a:defRPr sz="2000">
-                <a:solidFill>
-                  <a:schemeClr val="tx1"/>
-                </a:solidFill>
-                <a:latin typeface="Times New Roman" panose="02020603050405020304" pitchFamily="18" charset="0"/>
-              </a:defRPr>
-            </a:lvl5pPr>
-            <a:lvl6pPr marL="2514600" indent="-228600" eaLnBrk="0" fontAlgn="base" hangingPunct="0">
-              <a:spcBef>
-                <a:spcPct val="20000"/>
-              </a:spcBef>
-              <a:spcAft>
-                <a:spcPct val="0"/>
-              </a:spcAft>
-              <a:buChar char="»"/>
-              <a:defRPr sz="2000">
-                <a:solidFill>
-                  <a:schemeClr val="tx1"/>
-                </a:solidFill>
-                <a:latin typeface="Times New Roman" panose="02020603050405020304" pitchFamily="18" charset="0"/>
-              </a:defRPr>
-            </a:lvl6pPr>
-            <a:lvl7pPr marL="2971800" indent="-228600" eaLnBrk="0" fontAlgn="base" hangingPunct="0">
-              <a:spcBef>
-                <a:spcPct val="20000"/>
-              </a:spcBef>
-              <a:spcAft>
-                <a:spcPct val="0"/>
-              </a:spcAft>
-              <a:buChar char="»"/>
-              <a:defRPr sz="2000">
-                <a:solidFill>
-                  <a:schemeClr val="tx1"/>
-                </a:solidFill>
-                <a:latin typeface="Times New Roman" panose="02020603050405020304" pitchFamily="18" charset="0"/>
-              </a:defRPr>
-            </a:lvl7pPr>
-            <a:lvl8pPr marL="3429000" indent="-228600" eaLnBrk="0" fontAlgn="base" hangingPunct="0">
-              <a:spcBef>
-                <a:spcPct val="20000"/>
-              </a:spcBef>
-              <a:spcAft>
-                <a:spcPct val="0"/>
-              </a:spcAft>
-              <a:buChar char="»"/>
-              <a:defRPr sz="2000">
-                <a:solidFill>
-                  <a:schemeClr val="tx1"/>
-                </a:solidFill>
-                <a:latin typeface="Times New Roman" panose="02020603050405020304" pitchFamily="18" charset="0"/>
-              </a:defRPr>
-            </a:lvl8pPr>
-            <a:lvl9pPr marL="3886200" indent="-228600" eaLnBrk="0" fontAlgn="base" hangingPunct="0">
-              <a:spcBef>
-                <a:spcPct val="20000"/>
-              </a:spcBef>
-              <a:spcAft>
-                <a:spcPct val="0"/>
-              </a:spcAft>
-              <a:buChar char="»"/>
-              <a:defRPr sz="2000">
-                <a:solidFill>
-                  <a:schemeClr val="tx1"/>
-                </a:solidFill>
-                <a:latin typeface="Times New Roman" panose="02020603050405020304" pitchFamily="18" charset="0"/>
-              </a:defRPr>
-            </a:lvl9pPr>
-          </a:lstStyle>
-          <a:p>
-            <a:pPr eaLnBrk="1" hangingPunct="1">
-              <a:spcBef>
-                <a:spcPct val="50000"/>
-              </a:spcBef>
-              <a:buFontTx/>
-              <a:buNone/>
-            </a:pPr>
-            <a:r>
-              <a:rPr lang="es-ES" altLang="ca-ES" sz="2000" dirty="0" err="1">
-                <a:solidFill>
-                  <a:srgbClr val="FFFF99"/>
-                </a:solidFill>
-                <a:latin typeface="Swis721 Ex BT" pitchFamily="34" charset="0"/>
-              </a:rPr>
-              <a:t>Javascript</a:t>
-            </a:r>
-            <a:r>
-              <a:rPr lang="es-ES" altLang="ca-ES" sz="2000" dirty="0">
-                <a:solidFill>
-                  <a:srgbClr val="FFFF99"/>
-                </a:solidFill>
-                <a:latin typeface="Swis721 Ex BT" pitchFamily="34" charset="0"/>
-              </a:rPr>
-              <a:t>¿?</a:t>
-            </a:r>
-          </a:p>
-        </p:txBody>
-      </p:sp>
-      <p:pic>
-        <p:nvPicPr>
-          <p:cNvPr id="10" name="Imagen 9">
-            <a:extLst>
-              <a:ext uri="{FF2B5EF4-FFF2-40B4-BE49-F238E27FC236}">
-                <a16:creationId xmlns:a16="http://schemas.microsoft.com/office/drawing/2014/main" id="{A6345476-4D35-45F9-AB66-35BB06F8BD06}"/>
-              </a:ext>
-            </a:extLst>
-          </p:cNvPr>
-          <p:cNvPicPr>
-            <a:picLocks noChangeAspect="1"/>
-          </p:cNvPicPr>
-          <p:nvPr/>
-        </p:nvPicPr>
-        <p:blipFill>
-          <a:blip r:embed="rId2"/>
-          <a:stretch>
-            <a:fillRect/>
-          </a:stretch>
-        </p:blipFill>
-        <p:spPr>
-          <a:xfrm>
-            <a:off x="1331640" y="908720"/>
-            <a:ext cx="6806530" cy="5445224"/>
-          </a:xfrm>
-          <a:prstGeom prst="rect">
-            <a:avLst/>
-          </a:prstGeom>
-        </p:spPr>
-      </p:pic>
-    </p:spTree>
-    <p:extLst>
-      <p:ext uri="{BB962C8B-B14F-4D97-AF65-F5344CB8AC3E}">
-        <p14:creationId xmlns:p14="http://schemas.microsoft.com/office/powerpoint/2010/main" val="784667809"/>
-      </p:ext>
-    </p:extLst>
-  </p:cSld>
-  <p:clrMapOvr>
-    <a:masterClrMapping/>
-  </p:clrMapOvr>
-</p:sld>
-</file>
-
-<file path=ppt/slides/slide9.xml><?xml version="1.0" encoding="utf-8"?>
-<p:sld xmlns:a="http://schemas.openxmlformats.org/drawingml/2006/main" xmlns:r="http://schemas.openxmlformats.org/officeDocument/2006/relationships" xmlns:p="http://schemas.openxmlformats.org/presentationml/2006/main">
-  <p:cSld>
-    <p:spTree>
-      <p:nvGrpSpPr>
-        <p:cNvPr id="1" name=""/>
-        <p:cNvGrpSpPr/>
-        <p:nvPr/>
-      </p:nvGrpSpPr>
-      <p:grpSpPr>
-        <a:xfrm>
-          <a:off x="0" y="0"/>
-          <a:ext cx="0" cy="0"/>
-          <a:chOff x="0" y="0"/>
-          <a:chExt cx="0" cy="0"/>
-        </a:xfrm>
-      </p:grpSpPr>
-      <p:sp>
-        <p:nvSpPr>
-          <p:cNvPr id="2" name="Text Box 2">
-            <a:extLst>
-              <a:ext uri="{FF2B5EF4-FFF2-40B4-BE49-F238E27FC236}">
-                <a16:creationId xmlns:a16="http://schemas.microsoft.com/office/drawing/2014/main" id="{6D7650AE-C4F3-47FE-B940-CE2F45073856}"/>
-              </a:ext>
-            </a:extLst>
-          </p:cNvPr>
-          <p:cNvSpPr txBox="1">
-            <a:spLocks noChangeArrowheads="1"/>
-          </p:cNvSpPr>
-          <p:nvPr/>
-        </p:nvSpPr>
-        <p:spPr bwMode="auto">
-          <a:xfrm>
-            <a:off x="251520" y="404664"/>
-            <a:ext cx="6310313" cy="396875"/>
-          </a:xfrm>
-          <a:prstGeom prst="rect">
-            <a:avLst/>
-          </a:prstGeom>
-          <a:noFill/>
-          <a:ln>
-            <a:noFill/>
-          </a:ln>
-          <a:extLst>
-            <a:ext uri="{909E8E84-426E-40DD-AFC4-6F175D3DCCD1}">
-              <a14:hiddenFill xmlns:a14="http://schemas.microsoft.com/office/drawing/2010/main">
-                <a:solidFill>
-                  <a:srgbClr val="FFFFFF"/>
-                </a:solidFill>
-              </a14:hiddenFill>
-            </a:ext>
-            <a:ext uri="{91240B29-F687-4F45-9708-019B960494DF}">
-              <a14:hiddenLine xmlns:a14="http://schemas.microsoft.com/office/drawing/2010/main" w="9525">
-                <a:solidFill>
-                  <a:srgbClr val="000000"/>
-                </a:solidFill>
-                <a:miter lim="800000"/>
-                <a:headEnd/>
-                <a:tailEnd/>
-              </a14:hiddenLine>
-            </a:ext>
-          </a:extLst>
-        </p:spPr>
-        <p:txBody>
-          <a:bodyPr>
-            <a:spAutoFit/>
-          </a:bodyPr>
-          <a:lstStyle>
-            <a:lvl1pPr>
-              <a:spcBef>
-                <a:spcPct val="20000"/>
-              </a:spcBef>
-              <a:buChar char="•"/>
-              <a:defRPr sz="3200">
-                <a:solidFill>
-                  <a:schemeClr val="tx1"/>
-                </a:solidFill>
-                <a:latin typeface="Times New Roman" panose="02020603050405020304" pitchFamily="18" charset="0"/>
-              </a:defRPr>
-            </a:lvl1pPr>
-            <a:lvl2pPr marL="742950" indent="-285750">
-              <a:spcBef>
-                <a:spcPct val="20000"/>
-              </a:spcBef>
-              <a:buChar char="–"/>
-              <a:defRPr sz="2800">
-                <a:solidFill>
-                  <a:schemeClr val="tx1"/>
-                </a:solidFill>
-                <a:latin typeface="Times New Roman" panose="02020603050405020304" pitchFamily="18" charset="0"/>
-              </a:defRPr>
-            </a:lvl2pPr>
-            <a:lvl3pPr marL="1143000" indent="-228600">
-              <a:spcBef>
-                <a:spcPct val="20000"/>
-              </a:spcBef>
-              <a:buChar char="•"/>
-              <a:defRPr sz="2400">
-                <a:solidFill>
-                  <a:schemeClr val="tx1"/>
-                </a:solidFill>
-                <a:latin typeface="Times New Roman" panose="02020603050405020304" pitchFamily="18" charset="0"/>
-              </a:defRPr>
-            </a:lvl3pPr>
-            <a:lvl4pPr marL="1600200" indent="-228600">
-              <a:spcBef>
-                <a:spcPct val="20000"/>
-              </a:spcBef>
-              <a:buChar char="–"/>
-              <a:defRPr sz="2000">
-                <a:solidFill>
-                  <a:schemeClr val="tx1"/>
-                </a:solidFill>
-                <a:latin typeface="Times New Roman" panose="02020603050405020304" pitchFamily="18" charset="0"/>
-              </a:defRPr>
-            </a:lvl4pPr>
-            <a:lvl5pPr marL="2057400" indent="-228600">
-              <a:spcBef>
-                <a:spcPct val="20000"/>
-              </a:spcBef>
-              <a:buChar char="»"/>
-              <a:defRPr sz="2000">
-                <a:solidFill>
-                  <a:schemeClr val="tx1"/>
-                </a:solidFill>
-                <a:latin typeface="Times New Roman" panose="02020603050405020304" pitchFamily="18" charset="0"/>
-              </a:defRPr>
-            </a:lvl5pPr>
-            <a:lvl6pPr marL="2514600" indent="-228600" eaLnBrk="0" fontAlgn="base" hangingPunct="0">
-              <a:spcBef>
-                <a:spcPct val="20000"/>
-              </a:spcBef>
-              <a:spcAft>
-                <a:spcPct val="0"/>
-              </a:spcAft>
-              <a:buChar char="»"/>
-              <a:defRPr sz="2000">
-                <a:solidFill>
-                  <a:schemeClr val="tx1"/>
-                </a:solidFill>
-                <a:latin typeface="Times New Roman" panose="02020603050405020304" pitchFamily="18" charset="0"/>
-              </a:defRPr>
-            </a:lvl6pPr>
-            <a:lvl7pPr marL="2971800" indent="-228600" eaLnBrk="0" fontAlgn="base" hangingPunct="0">
-              <a:spcBef>
-                <a:spcPct val="20000"/>
-              </a:spcBef>
-              <a:spcAft>
-                <a:spcPct val="0"/>
-              </a:spcAft>
-              <a:buChar char="»"/>
-              <a:defRPr sz="2000">
-                <a:solidFill>
-                  <a:schemeClr val="tx1"/>
-                </a:solidFill>
-                <a:latin typeface="Times New Roman" panose="02020603050405020304" pitchFamily="18" charset="0"/>
-              </a:defRPr>
-            </a:lvl7pPr>
-            <a:lvl8pPr marL="3429000" indent="-228600" eaLnBrk="0" fontAlgn="base" hangingPunct="0">
-              <a:spcBef>
-                <a:spcPct val="20000"/>
-              </a:spcBef>
-              <a:spcAft>
-                <a:spcPct val="0"/>
-              </a:spcAft>
-              <a:buChar char="»"/>
-              <a:defRPr sz="2000">
-                <a:solidFill>
-                  <a:schemeClr val="tx1"/>
-                </a:solidFill>
-                <a:latin typeface="Times New Roman" panose="02020603050405020304" pitchFamily="18" charset="0"/>
-              </a:defRPr>
-            </a:lvl8pPr>
-            <a:lvl9pPr marL="3886200" indent="-228600" eaLnBrk="0" fontAlgn="base" hangingPunct="0">
-              <a:spcBef>
-                <a:spcPct val="20000"/>
-              </a:spcBef>
-              <a:spcAft>
-                <a:spcPct val="0"/>
-              </a:spcAft>
-              <a:buChar char="»"/>
-              <a:defRPr sz="2000">
-                <a:solidFill>
-                  <a:schemeClr val="tx1"/>
-                </a:solidFill>
-                <a:latin typeface="Times New Roman" panose="02020603050405020304" pitchFamily="18" charset="0"/>
-              </a:defRPr>
-            </a:lvl9pPr>
-          </a:lstStyle>
-          <a:p>
-            <a:pPr eaLnBrk="1" hangingPunct="1">
-              <a:spcBef>
-                <a:spcPct val="50000"/>
-              </a:spcBef>
-              <a:buFontTx/>
-              <a:buNone/>
-            </a:pPr>
-            <a:r>
-              <a:rPr lang="es-ES" altLang="ca-ES" sz="2000" dirty="0" err="1">
-                <a:solidFill>
-                  <a:srgbClr val="FFFF99"/>
-                </a:solidFill>
-                <a:latin typeface="Swis721 Ex BT" pitchFamily="34" charset="0"/>
-              </a:rPr>
-              <a:t>Javascript</a:t>
-            </a:r>
-            <a:r>
-              <a:rPr lang="es-ES" altLang="ca-ES" sz="2000" dirty="0">
-                <a:solidFill>
-                  <a:srgbClr val="FFFF99"/>
-                </a:solidFill>
-                <a:latin typeface="Swis721 Ex BT" pitchFamily="34" charset="0"/>
-              </a:rPr>
-              <a:t> puro o </a:t>
-            </a:r>
-            <a:r>
-              <a:rPr lang="es-ES" altLang="ca-ES" sz="2000" dirty="0" err="1">
-                <a:solidFill>
-                  <a:srgbClr val="FFFF99"/>
-                </a:solidFill>
-                <a:latin typeface="Swis721 Ex BT" pitchFamily="34" charset="0"/>
-              </a:rPr>
-              <a:t>Vanilla</a:t>
-            </a:r>
-            <a:r>
-              <a:rPr lang="es-ES" altLang="ca-ES" sz="2000" dirty="0">
-                <a:solidFill>
-                  <a:srgbClr val="FFFF99"/>
-                </a:solidFill>
-                <a:latin typeface="Swis721 Ex BT" pitchFamily="34" charset="0"/>
-              </a:rPr>
-              <a:t> </a:t>
-            </a:r>
-            <a:r>
-              <a:rPr lang="es-ES" altLang="ca-ES" sz="2000" dirty="0" err="1">
-                <a:solidFill>
-                  <a:srgbClr val="FFFF99"/>
-                </a:solidFill>
-                <a:latin typeface="Swis721 Ex BT" pitchFamily="34" charset="0"/>
-              </a:rPr>
-              <a:t>Javascript</a:t>
-            </a:r>
-            <a:endParaRPr lang="es-ES" altLang="ca-ES" sz="2000" dirty="0">
-              <a:solidFill>
-                <a:srgbClr val="FFFF99"/>
-              </a:solidFill>
-              <a:latin typeface="Swis721 Ex BT" pitchFamily="34" charset="0"/>
-            </a:endParaRPr>
-          </a:p>
-        </p:txBody>
-      </p:sp>
-      <p:sp>
-        <p:nvSpPr>
-          <p:cNvPr id="3" name="Rectángulo 2">
-            <a:extLst>
-              <a:ext uri="{FF2B5EF4-FFF2-40B4-BE49-F238E27FC236}">
-                <a16:creationId xmlns:a16="http://schemas.microsoft.com/office/drawing/2014/main" id="{C20349E6-0793-4C7C-A7B9-EC587CCAA0FF}"/>
-              </a:ext>
-            </a:extLst>
-          </p:cNvPr>
-          <p:cNvSpPr/>
-          <p:nvPr/>
-        </p:nvSpPr>
-        <p:spPr>
-          <a:xfrm>
-            <a:off x="3491880" y="5877272"/>
-            <a:ext cx="2791149" cy="369332"/>
-          </a:xfrm>
-          <a:prstGeom prst="rect">
-            <a:avLst/>
-          </a:prstGeom>
-        </p:spPr>
-        <p:txBody>
-          <a:bodyPr wrap="none">
-            <a:spAutoFit/>
-          </a:bodyPr>
-          <a:lstStyle/>
-          <a:p>
-            <a:r>
-              <a:rPr lang="es-ES" dirty="0">
-                <a:hlinkClick r:id="rId2"/>
-              </a:rPr>
-              <a:t>http://vanilla-js.com/</a:t>
-            </a:r>
-            <a:r>
-              <a:rPr lang="es-ES" dirty="0"/>
-              <a:t>(*)</a:t>
-            </a:r>
-          </a:p>
-        </p:txBody>
-      </p:sp>
-      <p:sp>
-        <p:nvSpPr>
-          <p:cNvPr id="4" name="Rectángulo 3">
-            <a:extLst>
-              <a:ext uri="{FF2B5EF4-FFF2-40B4-BE49-F238E27FC236}">
-                <a16:creationId xmlns:a16="http://schemas.microsoft.com/office/drawing/2014/main" id="{7C98AA02-7354-432A-8000-3B4E6C2DED80}"/>
-              </a:ext>
-            </a:extLst>
-          </p:cNvPr>
-          <p:cNvSpPr/>
-          <p:nvPr/>
-        </p:nvSpPr>
-        <p:spPr>
-          <a:xfrm>
-            <a:off x="827584" y="1484784"/>
-            <a:ext cx="7632848" cy="923330"/>
-          </a:xfrm>
-          <a:prstGeom prst="rect">
-            <a:avLst/>
-          </a:prstGeom>
-        </p:spPr>
-        <p:txBody>
-          <a:bodyPr wrap="square">
-            <a:spAutoFit/>
-          </a:bodyPr>
-          <a:lstStyle/>
-          <a:p>
-            <a:r>
-              <a:rPr lang="en-US" dirty="0"/>
-              <a:t>The terms Vanilla JavaScript and Vanilla JS refer to JavaScript not extended by any frameworks or additional libraries. Scripts written in Vanilla JS are plain JavaScript code.</a:t>
-            </a:r>
-            <a:endParaRPr lang="es-ES" dirty="0"/>
-          </a:p>
-        </p:txBody>
-      </p:sp>
-      <p:sp>
-        <p:nvSpPr>
-          <p:cNvPr id="5" name="CuadroTexto 4">
-            <a:extLst>
-              <a:ext uri="{FF2B5EF4-FFF2-40B4-BE49-F238E27FC236}">
-                <a16:creationId xmlns:a16="http://schemas.microsoft.com/office/drawing/2014/main" id="{C7812A46-27F2-44F5-943C-392D4AEA310D}"/>
-              </a:ext>
-            </a:extLst>
-          </p:cNvPr>
-          <p:cNvSpPr txBox="1"/>
-          <p:nvPr/>
-        </p:nvSpPr>
-        <p:spPr>
-          <a:xfrm>
-            <a:off x="827584" y="3284984"/>
-            <a:ext cx="7146508" cy="1200329"/>
-          </a:xfrm>
-          <a:prstGeom prst="rect">
-            <a:avLst/>
-          </a:prstGeom>
-          <a:noFill/>
-        </p:spPr>
-        <p:txBody>
-          <a:bodyPr wrap="none" rtlCol="0">
-            <a:spAutoFit/>
-          </a:bodyPr>
-          <a:lstStyle/>
-          <a:p>
-            <a:r>
-              <a:rPr lang="es-ES" dirty="0" err="1"/>
-              <a:t>Vanilla</a:t>
-            </a:r>
-            <a:r>
-              <a:rPr lang="es-ES" dirty="0"/>
-              <a:t> JS es una iniciativa, en forma de </a:t>
-            </a:r>
-            <a:r>
-              <a:rPr lang="es-ES" dirty="0" err="1"/>
-              <a:t>framework</a:t>
-            </a:r>
-            <a:r>
-              <a:rPr lang="es-ES" dirty="0"/>
-              <a:t>(*) que</a:t>
-            </a:r>
-          </a:p>
-          <a:p>
-            <a:r>
-              <a:rPr lang="es-ES" dirty="0"/>
-              <a:t> intenta enseñar las grandes ventajas de no usar </a:t>
-            </a:r>
-            <a:r>
-              <a:rPr lang="es-ES" dirty="0" err="1"/>
-              <a:t>frameworks</a:t>
-            </a:r>
-            <a:r>
-              <a:rPr lang="es-ES" dirty="0"/>
-              <a:t> y</a:t>
-            </a:r>
-          </a:p>
-          <a:p>
-            <a:r>
-              <a:rPr lang="es-ES" dirty="0"/>
-              <a:t> potenciar nuestras aplicaciones sin necesidad </a:t>
-            </a:r>
-          </a:p>
-          <a:p>
-            <a:r>
-              <a:rPr lang="es-ES" dirty="0"/>
-              <a:t>de añadir grandes archivos extra.</a:t>
-            </a:r>
-          </a:p>
-        </p:txBody>
-      </p:sp>
-    </p:spTree>
-    <p:extLst>
-      <p:ext uri="{BB962C8B-B14F-4D97-AF65-F5344CB8AC3E}">
-        <p14:creationId xmlns:p14="http://schemas.microsoft.com/office/powerpoint/2010/main" val="4104276394"/>
       </p:ext>
     </p:extLst>
   </p:cSld>

</xml_diff>